<commit_message>
UI-753: Updated presentation powerpoint
</commit_message>
<xml_diff>
--- a/apps/demo_done/presentation.pptx
+++ b/apps/demo_done/presentation.pptx
@@ -6,10 +6,25 @@
   </p:sldMasterIdLst>
   <p:sldIdLst>
     <p:sldId id="262" r:id="rId2"/>
-    <p:sldId id="261" r:id="rId3"/>
-    <p:sldId id="263" r:id="rId4"/>
-    <p:sldId id="258" r:id="rId5"/>
-    <p:sldId id="259" r:id="rId6"/>
+    <p:sldId id="278" r:id="rId3"/>
+    <p:sldId id="261" r:id="rId4"/>
+    <p:sldId id="264" r:id="rId5"/>
+    <p:sldId id="266" r:id="rId6"/>
+    <p:sldId id="275" r:id="rId7"/>
+    <p:sldId id="267" r:id="rId8"/>
+    <p:sldId id="268" r:id="rId9"/>
+    <p:sldId id="270" r:id="rId10"/>
+    <p:sldId id="269" r:id="rId11"/>
+    <p:sldId id="263" r:id="rId12"/>
+    <p:sldId id="271" r:id="rId13"/>
+    <p:sldId id="272" r:id="rId14"/>
+    <p:sldId id="273" r:id="rId15"/>
+    <p:sldId id="274" r:id="rId16"/>
+    <p:sldId id="276" r:id="rId17"/>
+    <p:sldId id="277" r:id="rId18"/>
+    <p:sldId id="265" r:id="rId19"/>
+    <p:sldId id="258" r:id="rId20"/>
+    <p:sldId id="259" r:id="rId21"/>
   </p:sldIdLst>
   <p:sldSz cx="9144000" cy="6858000" type="screen4x3"/>
   <p:notesSz cx="6858000" cy="9144000"/>
@@ -1245,7 +1260,7 @@
           <a:p>
             <a:fld id="{F1AEADE7-AD0E-3B4F-956B-743E3A45E088}" type="datetimeFigureOut">
               <a:rPr lang="en-US" smtClean="0"/>
-              <a:t>10/1/2014</a:t>
+              <a:t>10/2/2014</a:t>
             </a:fld>
             <a:endParaRPr lang="en-US"/>
           </a:p>
@@ -1653,7 +1668,26 @@
           <a:p>
             <a:r>
               <a:rPr lang="en-US" dirty="0" smtClean="0"/>
-              <a:t>Jean-Roch Maitre (JR)</a:t>
+              <a:t>Jean-Roch Maitre (IRC: JR^)</a:t>
+            </a:r>
+            <a:br>
+              <a:rPr lang="en-US" dirty="0" smtClean="0"/>
+            </a:br>
+            <a:r>
+              <a:rPr lang="en-US" dirty="0" err="1" smtClean="0"/>
+              <a:t>Joris</a:t>
+            </a:r>
+            <a:r>
+              <a:rPr lang="en-US" dirty="0" smtClean="0"/>
+              <a:t> Tirado (IRC: </a:t>
+            </a:r>
+            <a:r>
+              <a:rPr lang="en-US" dirty="0" err="1" smtClean="0"/>
+              <a:t>azefiel</a:t>
+            </a:r>
+            <a:r>
+              <a:rPr lang="en-US" dirty="0" smtClean="0"/>
+              <a:t>)</a:t>
             </a:r>
             <a:endParaRPr lang="en-US" dirty="0"/>
           </a:p>
@@ -1669,10 +1703,20 @@
   <p:clrMapOvr>
     <a:masterClrMapping/>
   </p:clrMapOvr>
+  <p:transition spd="slow">
+    <p:push dir="u"/>
+  </p:transition>
+  <p:timing>
+    <p:tnLst>
+      <p:par>
+        <p:cTn id="1" dur="indefinite" restart="never" nodeType="tmRoot"/>
+      </p:par>
+    </p:tnLst>
+  </p:timing>
 </p:sld>
 </file>
 
-<file path=ppt/slides/slide2.xml><?xml version="1.0" encoding="utf-8"?>
+<file path=ppt/slides/slide10.xml><?xml version="1.0" encoding="utf-8"?>
 <p:sld xmlns:a="http://schemas.openxmlformats.org/drawingml/2006/main" xmlns:r="http://schemas.openxmlformats.org/officeDocument/2006/relationships" xmlns:p="http://schemas.openxmlformats.org/presentationml/2006/main">
   <p:cSld>
     <p:spTree>
@@ -1701,120 +1745,67 @@
         </p:nvSpPr>
         <p:spPr/>
         <p:txBody>
-          <a:bodyPr/>
+          <a:bodyPr>
+            <a:normAutofit/>
+          </a:bodyPr>
           <a:lstStyle/>
           <a:p>
             <a:r>
               <a:rPr lang="en-US" dirty="0" smtClean="0"/>
-              <a:t>What’s Monster?</a:t>
+              <a:t>Check the results</a:t>
             </a:r>
             <a:endParaRPr lang="en-US" dirty="0"/>
           </a:p>
         </p:txBody>
       </p:sp>
-      <p:sp>
-        <p:nvSpPr>
-          <p:cNvPr id="3" name="TextBox 2"/>
-          <p:cNvSpPr txBox="1"/>
+      <p:pic>
+        <p:nvPicPr>
+          <p:cNvPr id="3" name="Picture 2"/>
+          <p:cNvPicPr>
+            <a:picLocks noChangeAspect="1"/>
+          </p:cNvPicPr>
           <p:nvPr/>
-        </p:nvSpPr>
+        </p:nvPicPr>
+        <p:blipFill>
+          <a:blip r:embed="rId2"/>
+          <a:stretch>
+            <a:fillRect/>
+          </a:stretch>
+        </p:blipFill>
         <p:spPr>
           <a:xfrm>
-            <a:off x="485775" y="1400175"/>
-            <a:ext cx="8043863" cy="4031873"/>
+            <a:off x="1627631" y="1596403"/>
+            <a:ext cx="6348205" cy="3542525"/>
           </a:xfrm>
           <a:prstGeom prst="rect">
             <a:avLst/>
           </a:prstGeom>
-          <a:noFill/>
         </p:spPr>
-        <p:txBody>
-          <a:bodyPr wrap="square" rtlCol="0">
-            <a:spAutoFit/>
-          </a:bodyPr>
-          <a:lstStyle/>
-          <a:p>
-            <a:pPr marL="285750" indent="-285750">
-              <a:buFontTx/>
-              <a:buChar char="-"/>
-            </a:pPr>
-            <a:r>
-              <a:rPr lang="en-US" sz="3200" dirty="0" smtClean="0"/>
-              <a:t>New UI developed by 2600hz</a:t>
-            </a:r>
-          </a:p>
-          <a:p>
-            <a:pPr marL="285750" indent="-285750">
-              <a:buFontTx/>
-              <a:buChar char="-"/>
-            </a:pPr>
-            <a:endParaRPr lang="en-US" sz="3200" dirty="0" smtClean="0"/>
-          </a:p>
-          <a:p>
-            <a:pPr marL="285750" indent="-285750">
-              <a:buFontTx/>
-              <a:buChar char="-"/>
-            </a:pPr>
-            <a:r>
-              <a:rPr lang="en-US" sz="3200" dirty="0" smtClean="0"/>
-              <a:t>Responsive for Desktops and Tablets</a:t>
-            </a:r>
-          </a:p>
-          <a:p>
-            <a:pPr marL="285750" indent="-285750">
-              <a:buFontTx/>
-              <a:buChar char="-"/>
-            </a:pPr>
-            <a:endParaRPr lang="en-US" sz="3200" dirty="0" smtClean="0"/>
-          </a:p>
-          <a:p>
-            <a:pPr marL="285750" indent="-285750">
-              <a:buFontTx/>
-              <a:buChar char="-"/>
-            </a:pPr>
-            <a:r>
-              <a:rPr lang="en-US" sz="3200" dirty="0" err="1" smtClean="0"/>
-              <a:t>Internationalizable</a:t>
-            </a:r>
-            <a:r>
-              <a:rPr lang="en-US" sz="3200" dirty="0" smtClean="0"/>
-              <a:t> (already available in English and French)</a:t>
-            </a:r>
-          </a:p>
-          <a:p>
-            <a:pPr marL="285750" indent="-285750">
-              <a:buFontTx/>
-              <a:buChar char="-"/>
-            </a:pPr>
-            <a:endParaRPr lang="en-US" sz="3200" dirty="0" smtClean="0"/>
-          </a:p>
-          <a:p>
-            <a:pPr marL="285750" indent="-285750">
-              <a:buFontTx/>
-              <a:buChar char="-"/>
-            </a:pPr>
-            <a:r>
-              <a:rPr lang="en-US" sz="3200" dirty="0" smtClean="0"/>
-              <a:t>Developer-friendly (app store, widgets, SDK)</a:t>
-            </a:r>
-            <a:endParaRPr lang="en-US" sz="3200" dirty="0"/>
-          </a:p>
-        </p:txBody>
-      </p:sp>
+      </p:pic>
     </p:spTree>
     <p:extLst>
       <p:ext uri="{BB962C8B-B14F-4D97-AF65-F5344CB8AC3E}">
-        <p14:creationId xmlns:p14="http://schemas.microsoft.com/office/powerpoint/2010/main" val="950094953"/>
+        <p14:creationId xmlns:p14="http://schemas.microsoft.com/office/powerpoint/2010/main" val="392318774"/>
       </p:ext>
     </p:extLst>
   </p:cSld>
   <p:clrMapOvr>
     <a:masterClrMapping/>
   </p:clrMapOvr>
+  <p:transition spd="slow">
+    <p:push dir="u"/>
+  </p:transition>
+  <p:timing>
+    <p:tnLst>
+      <p:par>
+        <p:cTn id="1" dur="indefinite" restart="never" nodeType="tmRoot"/>
+      </p:par>
+    </p:tnLst>
+  </p:timing>
 </p:sld>
 </file>
 
-<file path=ppt/slides/slide3.xml><?xml version="1.0" encoding="utf-8"?>
+<file path=ppt/slides/slide11.xml><?xml version="1.0" encoding="utf-8"?>
 <p:sld xmlns:a="http://schemas.openxmlformats.org/drawingml/2006/main" xmlns:r="http://schemas.openxmlformats.org/officeDocument/2006/relationships" xmlns:p="http://schemas.openxmlformats.org/presentationml/2006/main">
   <p:cSld>
     <p:spTree>
@@ -1848,7 +1839,7 @@
           <a:p>
             <a:r>
               <a:rPr lang="en-US" dirty="0" smtClean="0"/>
-              <a:t>Let’s write some code!</a:t>
+              <a:t>Now let’s write some code!</a:t>
             </a:r>
             <a:endParaRPr lang="en-US" dirty="0"/>
           </a:p>
@@ -1920,10 +1911,1106 @@
   <p:clrMapOvr>
     <a:masterClrMapping/>
   </p:clrMapOvr>
+  <p:transition spd="slow">
+    <p:push dir="u"/>
+  </p:transition>
+  <p:timing>
+    <p:tnLst>
+      <p:par>
+        <p:cTn id="1" dur="indefinite" restart="never" nodeType="tmRoot"/>
+      </p:par>
+    </p:tnLst>
+  </p:timing>
 </p:sld>
 </file>
 
-<file path=ppt/slides/slide4.xml><?xml version="1.0" encoding="utf-8"?>
+<file path=ppt/slides/slide12.xml><?xml version="1.0" encoding="utf-8"?>
+<p:sld xmlns:a="http://schemas.openxmlformats.org/drawingml/2006/main" xmlns:r="http://schemas.openxmlformats.org/officeDocument/2006/relationships" xmlns:p="http://schemas.openxmlformats.org/presentationml/2006/main">
+  <p:cSld>
+    <p:spTree>
+      <p:nvGrpSpPr>
+        <p:cNvPr id="1" name=""/>
+        <p:cNvGrpSpPr/>
+        <p:nvPr/>
+      </p:nvGrpSpPr>
+      <p:grpSpPr>
+        <a:xfrm>
+          <a:off x="0" y="0"/>
+          <a:ext cx="0" cy="0"/>
+          <a:chOff x="0" y="0"/>
+          <a:chExt cx="0" cy="0"/>
+        </a:xfrm>
+      </p:grpSpPr>
+      <p:sp>
+        <p:nvSpPr>
+          <p:cNvPr id="2" name="Title 1"/>
+          <p:cNvSpPr>
+            <a:spLocks noGrp="1"/>
+          </p:cNvSpPr>
+          <p:nvPr>
+            <p:ph type="title"/>
+          </p:nvPr>
+        </p:nvSpPr>
+        <p:spPr/>
+        <p:txBody>
+          <a:bodyPr/>
+          <a:lstStyle/>
+          <a:p>
+            <a:r>
+              <a:rPr lang="en-US" dirty="0" smtClean="0"/>
+              <a:t>Let’s change the HTML</a:t>
+            </a:r>
+            <a:endParaRPr lang="en-US" dirty="0"/>
+          </a:p>
+        </p:txBody>
+      </p:sp>
+      <p:sp>
+        <p:nvSpPr>
+          <p:cNvPr id="4" name="TextBox 3"/>
+          <p:cNvSpPr txBox="1"/>
+          <p:nvPr/>
+        </p:nvSpPr>
+        <p:spPr>
+          <a:xfrm>
+            <a:off x="603504" y="1472184"/>
+            <a:ext cx="6656832" cy="4431983"/>
+          </a:xfrm>
+          <a:prstGeom prst="rect">
+            <a:avLst/>
+          </a:prstGeom>
+          <a:noFill/>
+        </p:spPr>
+        <p:txBody>
+          <a:bodyPr wrap="square" rtlCol="0">
+            <a:spAutoFit/>
+          </a:bodyPr>
+          <a:lstStyle/>
+          <a:p>
+            <a:pPr marL="342900" indent="-342900">
+              <a:buAutoNum type="arabicParenR"/>
+            </a:pPr>
+            <a:r>
+              <a:rPr lang="en-US" sz="2400" dirty="0" smtClean="0"/>
+              <a:t>Remove everything inside layout.html</a:t>
+            </a:r>
+          </a:p>
+          <a:p>
+            <a:pPr marL="342900" indent="-342900">
+              <a:buAutoNum type="arabicParenR"/>
+            </a:pPr>
+            <a:r>
+              <a:rPr lang="en-US" sz="2400" dirty="0" smtClean="0"/>
+              <a:t>Copy the HTML block on the </a:t>
+            </a:r>
+            <a:r>
+              <a:rPr lang="en-US" sz="2400" dirty="0" err="1" smtClean="0"/>
+              <a:t>github</a:t>
+            </a:r>
+            <a:r>
+              <a:rPr lang="en-US" sz="2400" dirty="0" smtClean="0"/>
+              <a:t> page</a:t>
+            </a:r>
+          </a:p>
+          <a:p>
+            <a:pPr marL="342900" indent="-342900">
+              <a:buAutoNum type="arabicParenR"/>
+            </a:pPr>
+            <a:r>
+              <a:rPr lang="en-US" sz="2400" dirty="0" smtClean="0"/>
+              <a:t>Paste it in your layout.html, and Save the file!</a:t>
+            </a:r>
+          </a:p>
+          <a:p>
+            <a:pPr marL="342900" indent="-342900">
+              <a:buAutoNum type="arabicParenR"/>
+            </a:pPr>
+            <a:endParaRPr lang="en-US" sz="2400" dirty="0"/>
+          </a:p>
+          <a:p>
+            <a:pPr marL="342900" indent="-342900">
+              <a:buAutoNum type="arabicParenR"/>
+            </a:pPr>
+            <a:r>
+              <a:rPr lang="en-US" sz="2400" dirty="0" smtClean="0"/>
+              <a:t>We need to get the I18n strings as well!</a:t>
+            </a:r>
+          </a:p>
+          <a:p>
+            <a:pPr marL="342900" indent="-342900">
+              <a:buAutoNum type="arabicParenR"/>
+            </a:pPr>
+            <a:r>
+              <a:rPr lang="en-US" sz="2400" dirty="0" smtClean="0"/>
+              <a:t>Remove everything in your i18n/en-</a:t>
+            </a:r>
+            <a:r>
+              <a:rPr lang="en-US" sz="2400" dirty="0" err="1" smtClean="0"/>
+              <a:t>US.json</a:t>
+            </a:r>
+            <a:r>
+              <a:rPr lang="en-US" sz="2400" dirty="0" smtClean="0"/>
+              <a:t> file</a:t>
+            </a:r>
+          </a:p>
+          <a:p>
+            <a:pPr marL="342900" indent="-342900">
+              <a:buAutoNum type="arabicParenR"/>
+            </a:pPr>
+            <a:r>
+              <a:rPr lang="en-US" sz="2400" dirty="0" smtClean="0"/>
+              <a:t>On the </a:t>
+            </a:r>
+            <a:r>
+              <a:rPr lang="en-US" sz="2400" dirty="0" err="1" smtClean="0"/>
+              <a:t>github</a:t>
+            </a:r>
+            <a:r>
+              <a:rPr lang="en-US" sz="2400" dirty="0" smtClean="0"/>
+              <a:t> page, copy the I18n block</a:t>
+            </a:r>
+          </a:p>
+          <a:p>
+            <a:pPr marL="342900" indent="-342900">
+              <a:buAutoNum type="arabicParenR"/>
+            </a:pPr>
+            <a:r>
+              <a:rPr lang="en-US" sz="2400" dirty="0" smtClean="0"/>
+              <a:t>Paste it in your en-</a:t>
+            </a:r>
+            <a:r>
+              <a:rPr lang="en-US" sz="2400" dirty="0" err="1" smtClean="0"/>
+              <a:t>US.json</a:t>
+            </a:r>
+            <a:r>
+              <a:rPr lang="en-US" sz="2400" dirty="0" smtClean="0"/>
+              <a:t> file, and save it</a:t>
+            </a:r>
+          </a:p>
+          <a:p>
+            <a:pPr marL="342900" indent="-342900">
+              <a:buAutoNum type="arabicParenR"/>
+            </a:pPr>
+            <a:endParaRPr lang="en-US" sz="2400" dirty="0"/>
+          </a:p>
+          <a:p>
+            <a:pPr marL="342900" indent="-342900">
+              <a:buAutoNum type="arabicParenR"/>
+            </a:pPr>
+            <a:r>
+              <a:rPr lang="en-US" sz="2400" dirty="0" smtClean="0"/>
+              <a:t>We basically just replaced our welcome message with a mysterious table!</a:t>
+            </a:r>
+          </a:p>
+          <a:p>
+            <a:pPr marL="285750" indent="-285750">
+              <a:buFontTx/>
+              <a:buChar char="-"/>
+            </a:pPr>
+            <a:endParaRPr lang="en-US" dirty="0"/>
+          </a:p>
+        </p:txBody>
+      </p:sp>
+    </p:spTree>
+    <p:extLst>
+      <p:ext uri="{BB962C8B-B14F-4D97-AF65-F5344CB8AC3E}">
+        <p14:creationId xmlns:p14="http://schemas.microsoft.com/office/powerpoint/2010/main" val="1421117088"/>
+      </p:ext>
+    </p:extLst>
+  </p:cSld>
+  <p:clrMapOvr>
+    <a:masterClrMapping/>
+  </p:clrMapOvr>
+  <p:transition spd="slow">
+    <p:push dir="u"/>
+  </p:transition>
+  <p:timing>
+    <p:tnLst>
+      <p:par>
+        <p:cTn id="1" dur="indefinite" restart="never" nodeType="tmRoot"/>
+      </p:par>
+    </p:tnLst>
+  </p:timing>
+</p:sld>
+</file>
+
+<file path=ppt/slides/slide13.xml><?xml version="1.0" encoding="utf-8"?>
+<p:sld xmlns:a="http://schemas.openxmlformats.org/drawingml/2006/main" xmlns:r="http://schemas.openxmlformats.org/officeDocument/2006/relationships" xmlns:p="http://schemas.openxmlformats.org/presentationml/2006/main">
+  <p:cSld>
+    <p:spTree>
+      <p:nvGrpSpPr>
+        <p:cNvPr id="1" name=""/>
+        <p:cNvGrpSpPr/>
+        <p:nvPr/>
+      </p:nvGrpSpPr>
+      <p:grpSpPr>
+        <a:xfrm>
+          <a:off x="0" y="0"/>
+          <a:ext cx="0" cy="0"/>
+          <a:chOff x="0" y="0"/>
+          <a:chExt cx="0" cy="0"/>
+        </a:xfrm>
+      </p:grpSpPr>
+      <p:sp>
+        <p:nvSpPr>
+          <p:cNvPr id="2" name="Title 1"/>
+          <p:cNvSpPr>
+            <a:spLocks noGrp="1"/>
+          </p:cNvSpPr>
+          <p:nvPr>
+            <p:ph type="title"/>
+          </p:nvPr>
+        </p:nvSpPr>
+        <p:spPr/>
+        <p:txBody>
+          <a:bodyPr>
+            <a:normAutofit/>
+          </a:bodyPr>
+          <a:lstStyle/>
+          <a:p>
+            <a:r>
+              <a:rPr lang="en-US" dirty="0" smtClean="0"/>
+              <a:t>Check the results</a:t>
+            </a:r>
+            <a:endParaRPr lang="en-US" dirty="0"/>
+          </a:p>
+        </p:txBody>
+      </p:sp>
+      <p:pic>
+        <p:nvPicPr>
+          <p:cNvPr id="3" name="Picture 2"/>
+          <p:cNvPicPr>
+            <a:picLocks noChangeAspect="1"/>
+          </p:cNvPicPr>
+          <p:nvPr/>
+        </p:nvPicPr>
+        <p:blipFill>
+          <a:blip r:embed="rId2"/>
+          <a:stretch>
+            <a:fillRect/>
+          </a:stretch>
+        </p:blipFill>
+        <p:spPr>
+          <a:xfrm>
+            <a:off x="856678" y="1490472"/>
+            <a:ext cx="7864412" cy="3813048"/>
+          </a:xfrm>
+          <a:prstGeom prst="rect">
+            <a:avLst/>
+          </a:prstGeom>
+        </p:spPr>
+      </p:pic>
+    </p:spTree>
+    <p:extLst>
+      <p:ext uri="{BB962C8B-B14F-4D97-AF65-F5344CB8AC3E}">
+        <p14:creationId xmlns:p14="http://schemas.microsoft.com/office/powerpoint/2010/main" val="45414857"/>
+      </p:ext>
+    </p:extLst>
+  </p:cSld>
+  <p:clrMapOvr>
+    <a:masterClrMapping/>
+  </p:clrMapOvr>
+  <p:transition spd="slow">
+    <p:push dir="u"/>
+  </p:transition>
+  <p:timing>
+    <p:tnLst>
+      <p:par>
+        <p:cTn id="1" dur="indefinite" restart="never" nodeType="tmRoot"/>
+      </p:par>
+    </p:tnLst>
+  </p:timing>
+</p:sld>
+</file>
+
+<file path=ppt/slides/slide14.xml><?xml version="1.0" encoding="utf-8"?>
+<p:sld xmlns:a="http://schemas.openxmlformats.org/drawingml/2006/main" xmlns:r="http://schemas.openxmlformats.org/officeDocument/2006/relationships" xmlns:p="http://schemas.openxmlformats.org/presentationml/2006/main">
+  <p:cSld>
+    <p:spTree>
+      <p:nvGrpSpPr>
+        <p:cNvPr id="1" name=""/>
+        <p:cNvGrpSpPr/>
+        <p:nvPr/>
+      </p:nvGrpSpPr>
+      <p:grpSpPr>
+        <a:xfrm>
+          <a:off x="0" y="0"/>
+          <a:ext cx="0" cy="0"/>
+          <a:chOff x="0" y="0"/>
+          <a:chExt cx="0" cy="0"/>
+        </a:xfrm>
+      </p:grpSpPr>
+      <p:sp>
+        <p:nvSpPr>
+          <p:cNvPr id="2" name="Title 1"/>
+          <p:cNvSpPr>
+            <a:spLocks noGrp="1"/>
+          </p:cNvSpPr>
+          <p:nvPr>
+            <p:ph type="title"/>
+          </p:nvPr>
+        </p:nvSpPr>
+        <p:spPr/>
+        <p:txBody>
+          <a:bodyPr/>
+          <a:lstStyle/>
+          <a:p>
+            <a:r>
+              <a:rPr lang="en-US" dirty="0" smtClean="0"/>
+              <a:t>Where’s the magic at?</a:t>
+            </a:r>
+            <a:endParaRPr lang="en-US" dirty="0"/>
+          </a:p>
+        </p:txBody>
+      </p:sp>
+      <p:sp>
+        <p:nvSpPr>
+          <p:cNvPr id="3" name="TextBox 2"/>
+          <p:cNvSpPr txBox="1"/>
+          <p:nvPr/>
+        </p:nvSpPr>
+        <p:spPr>
+          <a:xfrm>
+            <a:off x="420624" y="1353312"/>
+            <a:ext cx="8449056" cy="4524315"/>
+          </a:xfrm>
+          <a:prstGeom prst="rect">
+            <a:avLst/>
+          </a:prstGeom>
+          <a:noFill/>
+        </p:spPr>
+        <p:txBody>
+          <a:bodyPr wrap="square" rtlCol="0">
+            <a:spAutoFit/>
+          </a:bodyPr>
+          <a:lstStyle/>
+          <a:p>
+            <a:r>
+              <a:rPr lang="en-US" sz="2400" dirty="0" smtClean="0"/>
+              <a:t>We need to add some JavaScript to track the Call Events now…</a:t>
+            </a:r>
+          </a:p>
+          <a:p>
+            <a:endParaRPr lang="en-US" sz="2400" dirty="0"/>
+          </a:p>
+          <a:p>
+            <a:pPr marL="342900" indent="-342900">
+              <a:buAutoNum type="arabicParenR"/>
+            </a:pPr>
+            <a:r>
+              <a:rPr lang="en-US" sz="2400" dirty="0" smtClean="0"/>
+              <a:t>Go at the </a:t>
+            </a:r>
+            <a:r>
+              <a:rPr lang="en-US" sz="2400" dirty="0" err="1" smtClean="0"/>
+              <a:t>github</a:t>
+            </a:r>
+            <a:r>
+              <a:rPr lang="en-US" sz="2400" dirty="0" smtClean="0"/>
+              <a:t> page, and get the Socket Events section</a:t>
+            </a:r>
+          </a:p>
+          <a:p>
+            <a:pPr marL="342900" indent="-342900">
+              <a:buAutoNum type="arabicParenR"/>
+            </a:pPr>
+            <a:endParaRPr lang="en-US" sz="2400" dirty="0" smtClean="0"/>
+          </a:p>
+          <a:p>
+            <a:pPr marL="342900" indent="-342900">
+              <a:buAutoNum type="arabicParenR"/>
+            </a:pPr>
+            <a:r>
+              <a:rPr lang="en-US" sz="2400" dirty="0" smtClean="0"/>
+              <a:t>Go in the app.js file, and paste the section just after the render function (don’t forget to add a coma after the brace of the render function!)</a:t>
+            </a:r>
+          </a:p>
+          <a:p>
+            <a:pPr marL="342900" indent="-342900">
+              <a:buAutoNum type="arabicParenR"/>
+            </a:pPr>
+            <a:endParaRPr lang="en-US" sz="2400" dirty="0" smtClean="0"/>
+          </a:p>
+          <a:p>
+            <a:pPr marL="342900" indent="-342900">
+              <a:buAutoNum type="arabicParenR"/>
+            </a:pPr>
+            <a:r>
+              <a:rPr lang="en-US" sz="2400" dirty="0" smtClean="0"/>
+              <a:t>Uncomment the </a:t>
+            </a:r>
+            <a:r>
+              <a:rPr lang="en-US" sz="2400" dirty="0" err="1" smtClean="0"/>
+              <a:t>self.bindEvents</a:t>
+            </a:r>
+            <a:r>
+              <a:rPr lang="en-US" sz="2400" dirty="0" smtClean="0"/>
+              <a:t>(</a:t>
+            </a:r>
+            <a:r>
+              <a:rPr lang="en-US" sz="2400" dirty="0" err="1" smtClean="0"/>
+              <a:t>skeletonTemplate</a:t>
+            </a:r>
+            <a:r>
+              <a:rPr lang="en-US" sz="2400" dirty="0" smtClean="0"/>
+              <a:t>) function</a:t>
+            </a:r>
+          </a:p>
+          <a:p>
+            <a:pPr marL="342900" indent="-342900">
+              <a:buAutoNum type="arabicParenR"/>
+            </a:pPr>
+            <a:endParaRPr lang="en-US" sz="2400" dirty="0"/>
+          </a:p>
+          <a:p>
+            <a:pPr marL="342900" indent="-342900">
+              <a:buAutoNum type="arabicParenR"/>
+            </a:pPr>
+            <a:r>
+              <a:rPr lang="en-US" sz="2400" dirty="0" smtClean="0"/>
+              <a:t>This function subscribes to a monster socket, and then trigger some JavaScript functions if those events are raised</a:t>
+            </a:r>
+          </a:p>
+        </p:txBody>
+      </p:sp>
+    </p:spTree>
+    <p:extLst>
+      <p:ext uri="{BB962C8B-B14F-4D97-AF65-F5344CB8AC3E}">
+        <p14:creationId xmlns:p14="http://schemas.microsoft.com/office/powerpoint/2010/main" val="358164934"/>
+      </p:ext>
+    </p:extLst>
+  </p:cSld>
+  <p:clrMapOvr>
+    <a:masterClrMapping/>
+  </p:clrMapOvr>
+  <p:transition spd="slow">
+    <p:push dir="u"/>
+  </p:transition>
+  <p:timing>
+    <p:tnLst>
+      <p:par>
+        <p:cTn id="1" dur="indefinite" restart="never" nodeType="tmRoot"/>
+      </p:par>
+    </p:tnLst>
+  </p:timing>
+</p:sld>
+</file>
+
+<file path=ppt/slides/slide15.xml><?xml version="1.0" encoding="utf-8"?>
+<p:sld xmlns:a="http://schemas.openxmlformats.org/drawingml/2006/main" xmlns:r="http://schemas.openxmlformats.org/officeDocument/2006/relationships" xmlns:p="http://schemas.openxmlformats.org/presentationml/2006/main">
+  <p:cSld>
+    <p:spTree>
+      <p:nvGrpSpPr>
+        <p:cNvPr id="1" name=""/>
+        <p:cNvGrpSpPr/>
+        <p:nvPr/>
+      </p:nvGrpSpPr>
+      <p:grpSpPr>
+        <a:xfrm>
+          <a:off x="0" y="0"/>
+          <a:ext cx="0" cy="0"/>
+          <a:chOff x="0" y="0"/>
+          <a:chExt cx="0" cy="0"/>
+        </a:xfrm>
+      </p:grpSpPr>
+      <p:sp>
+        <p:nvSpPr>
+          <p:cNvPr id="2" name="Title 1"/>
+          <p:cNvSpPr>
+            <a:spLocks noGrp="1"/>
+          </p:cNvSpPr>
+          <p:nvPr>
+            <p:ph type="title"/>
+          </p:nvPr>
+        </p:nvSpPr>
+        <p:spPr/>
+        <p:txBody>
+          <a:bodyPr/>
+          <a:lstStyle/>
+          <a:p>
+            <a:r>
+              <a:rPr lang="en-US" dirty="0" smtClean="0"/>
+              <a:t>Where’s the magic at?</a:t>
+            </a:r>
+            <a:endParaRPr lang="en-US" dirty="0"/>
+          </a:p>
+        </p:txBody>
+      </p:sp>
+      <p:sp>
+        <p:nvSpPr>
+          <p:cNvPr id="3" name="TextBox 2"/>
+          <p:cNvSpPr txBox="1"/>
+          <p:nvPr/>
+        </p:nvSpPr>
+        <p:spPr>
+          <a:xfrm>
+            <a:off x="466344" y="713232"/>
+            <a:ext cx="8174736" cy="6278642"/>
+          </a:xfrm>
+          <a:prstGeom prst="rect">
+            <a:avLst/>
+          </a:prstGeom>
+          <a:noFill/>
+        </p:spPr>
+        <p:txBody>
+          <a:bodyPr wrap="square" rtlCol="0">
+            <a:spAutoFit/>
+          </a:bodyPr>
+          <a:lstStyle/>
+          <a:p>
+            <a:pPr marL="342900" indent="-342900">
+              <a:buAutoNum type="arabicParenR"/>
+            </a:pPr>
+            <a:endParaRPr lang="en-US" sz="2400" dirty="0"/>
+          </a:p>
+          <a:p>
+            <a:pPr marL="342900" indent="-342900">
+              <a:buAutoNum type="arabicParenR"/>
+            </a:pPr>
+            <a:r>
+              <a:rPr lang="en-US" sz="2400" dirty="0"/>
+              <a:t>In order for our demo to work, we need to add 2 more things we’re using in this </a:t>
+            </a:r>
+            <a:r>
+              <a:rPr lang="en-US" sz="2400" dirty="0" smtClean="0"/>
+              <a:t>function</a:t>
+            </a:r>
+          </a:p>
+          <a:p>
+            <a:pPr marL="342900" indent="-342900">
+              <a:buAutoNum type="arabicParenR"/>
+            </a:pPr>
+            <a:endParaRPr lang="en-US" sz="2400" dirty="0"/>
+          </a:p>
+          <a:p>
+            <a:pPr marL="342900" indent="-342900">
+              <a:buAutoNum type="arabicParenR"/>
+            </a:pPr>
+            <a:r>
+              <a:rPr lang="en-US" sz="2400" dirty="0"/>
+              <a:t>First, we need to create a new event.html template inside the views </a:t>
+            </a:r>
+            <a:r>
+              <a:rPr lang="en-US" sz="2400" dirty="0" smtClean="0"/>
+              <a:t>folder and paste the code from the </a:t>
+            </a:r>
+            <a:r>
+              <a:rPr lang="en-US" sz="2400" dirty="0" err="1" smtClean="0"/>
+              <a:t>github</a:t>
+            </a:r>
+            <a:r>
+              <a:rPr lang="en-US" sz="2400" dirty="0" smtClean="0"/>
+              <a:t> page in there</a:t>
+            </a:r>
+          </a:p>
+          <a:p>
+            <a:pPr marL="342900" indent="-342900">
+              <a:buAutoNum type="arabicParenR"/>
+            </a:pPr>
+            <a:endParaRPr lang="en-US" sz="2400" dirty="0"/>
+          </a:p>
+          <a:p>
+            <a:pPr marL="342900" indent="-342900">
+              <a:buAutoNum type="arabicParenR"/>
+            </a:pPr>
+            <a:r>
+              <a:rPr lang="en-US" sz="2400" dirty="0" smtClean="0"/>
+              <a:t>Then we need to add the </a:t>
+            </a:r>
+            <a:r>
+              <a:rPr lang="en-US" sz="2400" dirty="0" err="1" smtClean="0"/>
+              <a:t>formatEvent</a:t>
+            </a:r>
+            <a:r>
+              <a:rPr lang="en-US" sz="2400" dirty="0" smtClean="0"/>
+              <a:t> function from the </a:t>
+            </a:r>
+            <a:r>
+              <a:rPr lang="en-US" sz="2400" dirty="0" err="1" smtClean="0"/>
+              <a:t>github</a:t>
+            </a:r>
+            <a:r>
+              <a:rPr lang="en-US" sz="2400" dirty="0" smtClean="0"/>
+              <a:t> page after our </a:t>
+            </a:r>
+            <a:r>
+              <a:rPr lang="en-US" sz="2400" dirty="0" err="1" smtClean="0"/>
+              <a:t>bindEvents</a:t>
+            </a:r>
+            <a:r>
+              <a:rPr lang="en-US" sz="2400" dirty="0" smtClean="0"/>
+              <a:t> function in the app.js file</a:t>
+            </a:r>
+          </a:p>
+          <a:p>
+            <a:pPr marL="342900" indent="-342900">
+              <a:buAutoNum type="arabicParenR"/>
+            </a:pPr>
+            <a:endParaRPr lang="en-US" sz="2400" dirty="0"/>
+          </a:p>
+          <a:p>
+            <a:r>
+              <a:rPr lang="en-US" sz="2400" dirty="0" smtClean="0"/>
+              <a:t>- </a:t>
+            </a:r>
+            <a:r>
+              <a:rPr lang="en-US" sz="2400" dirty="0" err="1" smtClean="0"/>
+              <a:t>formatEvent</a:t>
+            </a:r>
+            <a:r>
+              <a:rPr lang="en-US" sz="2400" dirty="0" smtClean="0"/>
+              <a:t> will allow us to give some </a:t>
+            </a:r>
+            <a:r>
+              <a:rPr lang="en-US" sz="2400" dirty="0" err="1" smtClean="0"/>
+              <a:t>formattedData</a:t>
+            </a:r>
+            <a:r>
+              <a:rPr lang="en-US" sz="2400" dirty="0" smtClean="0"/>
+              <a:t> to our HTML template, so it doesn’t have to do any logic</a:t>
+            </a:r>
+          </a:p>
+          <a:p>
+            <a:pPr marL="342900" indent="-342900">
+              <a:buAutoNum type="arabicParenR"/>
+            </a:pPr>
+            <a:endParaRPr lang="en-US" sz="2400" dirty="0"/>
+          </a:p>
+          <a:p>
+            <a:r>
+              <a:rPr lang="en-US" sz="2400" dirty="0" smtClean="0"/>
+              <a:t>- The event.html template is just a table line we’ll add anytime we catch an event</a:t>
+            </a:r>
+          </a:p>
+          <a:p>
+            <a:endParaRPr lang="en-US" sz="2400" dirty="0"/>
+          </a:p>
+          <a:p>
+            <a:endParaRPr lang="en-US" dirty="0"/>
+          </a:p>
+        </p:txBody>
+      </p:sp>
+    </p:spTree>
+    <p:extLst>
+      <p:ext uri="{BB962C8B-B14F-4D97-AF65-F5344CB8AC3E}">
+        <p14:creationId xmlns:p14="http://schemas.microsoft.com/office/powerpoint/2010/main" val="3962211652"/>
+      </p:ext>
+    </p:extLst>
+  </p:cSld>
+  <p:clrMapOvr>
+    <a:masterClrMapping/>
+  </p:clrMapOvr>
+  <p:transition spd="slow">
+    <p:push dir="u"/>
+  </p:transition>
+  <p:timing>
+    <p:tnLst>
+      <p:par>
+        <p:cTn id="1" dur="indefinite" restart="never" nodeType="tmRoot"/>
+      </p:par>
+    </p:tnLst>
+  </p:timing>
+</p:sld>
+</file>
+
+<file path=ppt/slides/slide16.xml><?xml version="1.0" encoding="utf-8"?>
+<p:sld xmlns:a="http://schemas.openxmlformats.org/drawingml/2006/main" xmlns:r="http://schemas.openxmlformats.org/officeDocument/2006/relationships" xmlns:p="http://schemas.openxmlformats.org/presentationml/2006/main">
+  <p:cSld>
+    <p:spTree>
+      <p:nvGrpSpPr>
+        <p:cNvPr id="1" name=""/>
+        <p:cNvGrpSpPr/>
+        <p:nvPr/>
+      </p:nvGrpSpPr>
+      <p:grpSpPr>
+        <a:xfrm>
+          <a:off x="0" y="0"/>
+          <a:ext cx="0" cy="0"/>
+          <a:chOff x="0" y="0"/>
+          <a:chExt cx="0" cy="0"/>
+        </a:xfrm>
+      </p:grpSpPr>
+      <p:sp>
+        <p:nvSpPr>
+          <p:cNvPr id="2" name="Title 1"/>
+          <p:cNvSpPr>
+            <a:spLocks noGrp="1"/>
+          </p:cNvSpPr>
+          <p:nvPr>
+            <p:ph type="title"/>
+          </p:nvPr>
+        </p:nvSpPr>
+        <p:spPr/>
+        <p:txBody>
+          <a:bodyPr/>
+          <a:lstStyle/>
+          <a:p>
+            <a:r>
+              <a:rPr lang="en-US" dirty="0" err="1" smtClean="0"/>
+              <a:t>Woohoo</a:t>
+            </a:r>
+            <a:r>
+              <a:rPr lang="en-US" dirty="0" smtClean="0"/>
+              <a:t>!</a:t>
+            </a:r>
+            <a:endParaRPr lang="en-US" dirty="0"/>
+          </a:p>
+        </p:txBody>
+      </p:sp>
+      <p:pic>
+        <p:nvPicPr>
+          <p:cNvPr id="3" name="Picture 2"/>
+          <p:cNvPicPr>
+            <a:picLocks noChangeAspect="1"/>
+          </p:cNvPicPr>
+          <p:nvPr/>
+        </p:nvPicPr>
+        <p:blipFill>
+          <a:blip r:embed="rId2"/>
+          <a:stretch>
+            <a:fillRect/>
+          </a:stretch>
+        </p:blipFill>
+        <p:spPr>
+          <a:xfrm>
+            <a:off x="987552" y="1204414"/>
+            <a:ext cx="7477738" cy="4958642"/>
+          </a:xfrm>
+          <a:prstGeom prst="rect">
+            <a:avLst/>
+          </a:prstGeom>
+        </p:spPr>
+      </p:pic>
+    </p:spTree>
+    <p:extLst>
+      <p:ext uri="{BB962C8B-B14F-4D97-AF65-F5344CB8AC3E}">
+        <p14:creationId xmlns:p14="http://schemas.microsoft.com/office/powerpoint/2010/main" val="141440208"/>
+      </p:ext>
+    </p:extLst>
+  </p:cSld>
+  <p:clrMapOvr>
+    <a:masterClrMapping/>
+  </p:clrMapOvr>
+  <p:transition spd="slow">
+    <p:push dir="u"/>
+  </p:transition>
+  <p:timing>
+    <p:tnLst>
+      <p:par>
+        <p:cTn id="1" dur="indefinite" restart="never" nodeType="tmRoot"/>
+      </p:par>
+    </p:tnLst>
+  </p:timing>
+</p:sld>
+</file>
+
+<file path=ppt/slides/slide17.xml><?xml version="1.0" encoding="utf-8"?>
+<p:sld xmlns:a="http://schemas.openxmlformats.org/drawingml/2006/main" xmlns:r="http://schemas.openxmlformats.org/officeDocument/2006/relationships" xmlns:p="http://schemas.openxmlformats.org/presentationml/2006/main">
+  <p:cSld>
+    <p:spTree>
+      <p:nvGrpSpPr>
+        <p:cNvPr id="1" name=""/>
+        <p:cNvGrpSpPr/>
+        <p:nvPr/>
+      </p:nvGrpSpPr>
+      <p:grpSpPr>
+        <a:xfrm>
+          <a:off x="0" y="0"/>
+          <a:ext cx="0" cy="0"/>
+          <a:chOff x="0" y="0"/>
+          <a:chExt cx="0" cy="0"/>
+        </a:xfrm>
+      </p:grpSpPr>
+      <p:sp>
+        <p:nvSpPr>
+          <p:cNvPr id="2" name="Title 1"/>
+          <p:cNvSpPr>
+            <a:spLocks noGrp="1"/>
+          </p:cNvSpPr>
+          <p:nvPr>
+            <p:ph type="title"/>
+          </p:nvPr>
+        </p:nvSpPr>
+        <p:spPr/>
+        <p:txBody>
+          <a:bodyPr/>
+          <a:lstStyle/>
+          <a:p>
+            <a:r>
+              <a:rPr lang="en-US" dirty="0" smtClean="0"/>
+              <a:t>Quick glance at the Kazoo JS SDK</a:t>
+            </a:r>
+            <a:endParaRPr lang="en-US" dirty="0"/>
+          </a:p>
+        </p:txBody>
+      </p:sp>
+      <p:sp>
+        <p:nvSpPr>
+          <p:cNvPr id="3" name="TextBox 2"/>
+          <p:cNvSpPr txBox="1"/>
+          <p:nvPr/>
+        </p:nvSpPr>
+        <p:spPr>
+          <a:xfrm>
+            <a:off x="307910" y="1651519"/>
+            <a:ext cx="8556172" cy="4524315"/>
+          </a:xfrm>
+          <a:prstGeom prst="rect">
+            <a:avLst/>
+          </a:prstGeom>
+          <a:noFill/>
+        </p:spPr>
+        <p:txBody>
+          <a:bodyPr wrap="square" rtlCol="0">
+            <a:spAutoFit/>
+          </a:bodyPr>
+          <a:lstStyle/>
+          <a:p>
+            <a:pPr marL="285750" indent="-285750">
+              <a:buFontTx/>
+              <a:buChar char="-"/>
+            </a:pPr>
+            <a:r>
+              <a:rPr lang="en-US" sz="3200" dirty="0" smtClean="0"/>
+              <a:t>Call any supported Kazoo API from your Monster app</a:t>
+            </a:r>
+          </a:p>
+          <a:p>
+            <a:pPr marL="285750" indent="-285750">
+              <a:buFontTx/>
+              <a:buChar char="-"/>
+            </a:pPr>
+            <a:endParaRPr lang="en-US" sz="3200" dirty="0" smtClean="0"/>
+          </a:p>
+          <a:p>
+            <a:pPr marL="285750" indent="-285750">
+              <a:buFontTx/>
+              <a:buChar char="-"/>
+            </a:pPr>
+            <a:endParaRPr lang="en-US" sz="3200" dirty="0" smtClean="0"/>
+          </a:p>
+          <a:p>
+            <a:pPr marL="285750" indent="-285750">
+              <a:buFontTx/>
+              <a:buChar char="-"/>
+            </a:pPr>
+            <a:r>
+              <a:rPr lang="en-US" sz="3200" dirty="0" smtClean="0"/>
+              <a:t>Usable outside Monster if you need to use it in your own UI !</a:t>
+            </a:r>
+          </a:p>
+          <a:p>
+            <a:pPr marL="285750" indent="-285750">
+              <a:buFontTx/>
+              <a:buChar char="-"/>
+            </a:pPr>
+            <a:endParaRPr lang="en-US" sz="3200" dirty="0" smtClean="0"/>
+          </a:p>
+          <a:p>
+            <a:pPr marL="285750" indent="-285750">
+              <a:buFontTx/>
+              <a:buChar char="-"/>
+            </a:pPr>
+            <a:endParaRPr lang="en-US" sz="3200" dirty="0"/>
+          </a:p>
+          <a:p>
+            <a:pPr marL="285750" indent="-285750">
+              <a:buFontTx/>
+              <a:buChar char="-"/>
+            </a:pPr>
+            <a:r>
+              <a:rPr lang="en-US" sz="3200" dirty="0" smtClean="0"/>
+              <a:t>Let’s look at a quick example</a:t>
+            </a:r>
+          </a:p>
+        </p:txBody>
+      </p:sp>
+    </p:spTree>
+    <p:extLst>
+      <p:ext uri="{BB962C8B-B14F-4D97-AF65-F5344CB8AC3E}">
+        <p14:creationId xmlns:p14="http://schemas.microsoft.com/office/powerpoint/2010/main" val="800625892"/>
+      </p:ext>
+    </p:extLst>
+  </p:cSld>
+  <p:clrMapOvr>
+    <a:masterClrMapping/>
+  </p:clrMapOvr>
+  <p:transition spd="slow">
+    <p:push dir="u"/>
+  </p:transition>
+  <p:timing>
+    <p:tnLst>
+      <p:par>
+        <p:cTn id="1" dur="indefinite" restart="never" nodeType="tmRoot"/>
+      </p:par>
+    </p:tnLst>
+  </p:timing>
+</p:sld>
+</file>
+
+<file path=ppt/slides/slide18.xml><?xml version="1.0" encoding="utf-8"?>
+<p:sld xmlns:a="http://schemas.openxmlformats.org/drawingml/2006/main" xmlns:r="http://schemas.openxmlformats.org/officeDocument/2006/relationships" xmlns:p="http://schemas.openxmlformats.org/presentationml/2006/main">
+  <p:cSld>
+    <p:spTree>
+      <p:nvGrpSpPr>
+        <p:cNvPr id="1" name=""/>
+        <p:cNvGrpSpPr/>
+        <p:nvPr/>
+      </p:nvGrpSpPr>
+      <p:grpSpPr>
+        <a:xfrm>
+          <a:off x="0" y="0"/>
+          <a:ext cx="0" cy="0"/>
+          <a:chOff x="0" y="0"/>
+          <a:chExt cx="0" cy="0"/>
+        </a:xfrm>
+      </p:grpSpPr>
+      <p:sp>
+        <p:nvSpPr>
+          <p:cNvPr id="2" name="Title 1"/>
+          <p:cNvSpPr>
+            <a:spLocks noGrp="1"/>
+          </p:cNvSpPr>
+          <p:nvPr>
+            <p:ph type="title"/>
+          </p:nvPr>
+        </p:nvSpPr>
+        <p:spPr/>
+        <p:txBody>
+          <a:bodyPr/>
+          <a:lstStyle/>
+          <a:p>
+            <a:r>
+              <a:rPr lang="en-US" dirty="0" smtClean="0"/>
+              <a:t>The future of Monster UI</a:t>
+            </a:r>
+            <a:endParaRPr lang="en-US" dirty="0"/>
+          </a:p>
+        </p:txBody>
+      </p:sp>
+      <p:sp>
+        <p:nvSpPr>
+          <p:cNvPr id="4" name="TextBox 3"/>
+          <p:cNvSpPr txBox="1"/>
+          <p:nvPr/>
+        </p:nvSpPr>
+        <p:spPr>
+          <a:xfrm>
+            <a:off x="208113" y="1335024"/>
+            <a:ext cx="8861241" cy="5078313"/>
+          </a:xfrm>
+          <a:prstGeom prst="rect">
+            <a:avLst/>
+          </a:prstGeom>
+          <a:noFill/>
+        </p:spPr>
+        <p:txBody>
+          <a:bodyPr wrap="square" rtlCol="0">
+            <a:spAutoFit/>
+          </a:bodyPr>
+          <a:lstStyle/>
+          <a:p>
+            <a:pPr marL="285750" indent="-285750">
+              <a:buFontTx/>
+              <a:buChar char="-"/>
+            </a:pPr>
+            <a:r>
+              <a:rPr lang="en-US" sz="3200" dirty="0" smtClean="0"/>
+              <a:t>Improvement of the app store with new back-end APIs to allow you to sell apps!</a:t>
+            </a:r>
+          </a:p>
+          <a:p>
+            <a:pPr marL="285750" indent="-285750">
+              <a:buFontTx/>
+              <a:buChar char="-"/>
+            </a:pPr>
+            <a:endParaRPr lang="en-US" sz="3200" dirty="0"/>
+          </a:p>
+          <a:p>
+            <a:pPr marL="285750" indent="-285750">
+              <a:buFontTx/>
+              <a:buChar char="-"/>
+            </a:pPr>
+            <a:r>
+              <a:rPr lang="en-US" sz="3200" dirty="0" smtClean="0"/>
+              <a:t>Now that the core is “done”, we’ll focus on building new cool apps (</a:t>
+            </a:r>
+            <a:r>
+              <a:rPr lang="en-US" sz="3200" dirty="0" err="1" smtClean="0"/>
+              <a:t>Callflow</a:t>
+            </a:r>
+            <a:r>
+              <a:rPr lang="en-US" sz="3200" dirty="0" smtClean="0"/>
+              <a:t> manager, User Portal, </a:t>
+            </a:r>
+            <a:r>
+              <a:rPr lang="en-US" sz="3200" dirty="0" err="1" smtClean="0"/>
+              <a:t>FaxBox</a:t>
+            </a:r>
+            <a:r>
+              <a:rPr lang="en-US" sz="3200" dirty="0" smtClean="0"/>
+              <a:t> Manager…)</a:t>
+            </a:r>
+          </a:p>
+          <a:p>
+            <a:pPr marL="285750" indent="-285750">
+              <a:buFontTx/>
+              <a:buChar char="-"/>
+            </a:pPr>
+            <a:endParaRPr lang="en-US" sz="3200" dirty="0"/>
+          </a:p>
+          <a:p>
+            <a:pPr marL="285750" indent="-285750">
+              <a:buFontTx/>
+              <a:buChar char="-"/>
+            </a:pPr>
+            <a:r>
+              <a:rPr lang="en-US" sz="3200" dirty="0" smtClean="0"/>
+              <a:t>We want your feedback, come see the Front-End team and ask questions! </a:t>
+            </a:r>
+            <a:r>
+              <a:rPr lang="en-US" sz="3200" dirty="0" smtClean="0">
+                <a:sym typeface="Wingdings" panose="05000000000000000000" pitchFamily="2" charset="2"/>
+              </a:rPr>
+              <a:t></a:t>
+            </a:r>
+            <a:endParaRPr lang="en-US" sz="3200" dirty="0" smtClean="0"/>
+          </a:p>
+          <a:p>
+            <a:endParaRPr lang="en-US" dirty="0"/>
+          </a:p>
+          <a:p>
+            <a:pPr marL="285750" indent="-285750">
+              <a:buFontTx/>
+              <a:buChar char="-"/>
+            </a:pPr>
+            <a:endParaRPr lang="en-US" dirty="0"/>
+          </a:p>
+        </p:txBody>
+      </p:sp>
+    </p:spTree>
+    <p:extLst>
+      <p:ext uri="{BB962C8B-B14F-4D97-AF65-F5344CB8AC3E}">
+        <p14:creationId xmlns:p14="http://schemas.microsoft.com/office/powerpoint/2010/main" val="1877318565"/>
+      </p:ext>
+    </p:extLst>
+  </p:cSld>
+  <p:clrMapOvr>
+    <a:masterClrMapping/>
+  </p:clrMapOvr>
+  <p:transition spd="slow">
+    <p:push dir="u"/>
+  </p:transition>
+  <p:timing>
+    <p:tnLst>
+      <p:par>
+        <p:cTn id="1" dur="indefinite" restart="never" nodeType="tmRoot"/>
+      </p:par>
+    </p:tnLst>
+  </p:timing>
+</p:sld>
+</file>
+
+<file path=ppt/slides/slide19.xml><?xml version="1.0" encoding="utf-8"?>
 <p:sld xmlns:a="http://schemas.openxmlformats.org/drawingml/2006/main" xmlns:r="http://schemas.openxmlformats.org/officeDocument/2006/relationships" xmlns:p="http://schemas.openxmlformats.org/presentationml/2006/main">
   <p:cSld>
     <p:spTree>
@@ -1942,7 +3029,7 @@
       </p:grpSpPr>
       <p:pic>
         <p:nvPicPr>
-          <p:cNvPr id="3" name="Picture 2" descr="http://assets.sbnation.com/assets/526158/fiskers_question_mark_medium.jpg"/>
+          <p:cNvPr id="3" name="Content Placeholder 2" descr="http://assets.sbnation.com/assets/526158/fiskers_question_mark_medium.jpg"/>
           <p:cNvPicPr>
             <a:picLocks noGrp="1" noChangeAspect="1" noChangeArrowheads="1"/>
           </p:cNvPicPr>
@@ -2032,6 +3119,566 @@
   <p:clrMapOvr>
     <a:masterClrMapping/>
   </p:clrMapOvr>
+  <p:transition spd="slow">
+    <p:push dir="u"/>
+  </p:transition>
+  <p:timing>
+    <p:tnLst>
+      <p:par>
+        <p:cTn id="1" dur="indefinite" restart="never" nodeType="tmRoot"/>
+      </p:par>
+    </p:tnLst>
+  </p:timing>
+</p:sld>
+</file>
+
+<file path=ppt/slides/slide2.xml><?xml version="1.0" encoding="utf-8"?>
+<p:sld xmlns:a="http://schemas.openxmlformats.org/drawingml/2006/main" xmlns:r="http://schemas.openxmlformats.org/officeDocument/2006/relationships" xmlns:p="http://schemas.openxmlformats.org/presentationml/2006/main">
+  <p:cSld>
+    <p:spTree>
+      <p:nvGrpSpPr>
+        <p:cNvPr id="1" name=""/>
+        <p:cNvGrpSpPr/>
+        <p:nvPr/>
+      </p:nvGrpSpPr>
+      <p:grpSpPr>
+        <a:xfrm>
+          <a:off x="0" y="0"/>
+          <a:ext cx="0" cy="0"/>
+          <a:chOff x="0" y="0"/>
+          <a:chExt cx="0" cy="0"/>
+        </a:xfrm>
+      </p:grpSpPr>
+      <p:sp>
+        <p:nvSpPr>
+          <p:cNvPr id="2" name="Title 1"/>
+          <p:cNvSpPr>
+            <a:spLocks noGrp="1"/>
+          </p:cNvSpPr>
+          <p:nvPr>
+            <p:ph type="title"/>
+          </p:nvPr>
+        </p:nvSpPr>
+        <p:spPr/>
+        <p:txBody>
+          <a:bodyPr/>
+          <a:lstStyle/>
+          <a:p>
+            <a:r>
+              <a:rPr lang="en-US" dirty="0" smtClean="0"/>
+              <a:t>Presenters</a:t>
+            </a:r>
+            <a:endParaRPr lang="en-US" dirty="0"/>
+          </a:p>
+        </p:txBody>
+      </p:sp>
+      <p:sp>
+        <p:nvSpPr>
+          <p:cNvPr id="3" name="TextBox 2"/>
+          <p:cNvSpPr txBox="1"/>
+          <p:nvPr/>
+        </p:nvSpPr>
+        <p:spPr>
+          <a:xfrm>
+            <a:off x="3218688" y="1627632"/>
+            <a:ext cx="5367528" cy="923330"/>
+          </a:xfrm>
+          <a:prstGeom prst="rect">
+            <a:avLst/>
+          </a:prstGeom>
+          <a:noFill/>
+        </p:spPr>
+        <p:txBody>
+          <a:bodyPr wrap="square" rtlCol="0">
+            <a:spAutoFit/>
+          </a:bodyPr>
+          <a:lstStyle/>
+          <a:p>
+            <a:r>
+              <a:rPr lang="en-US" dirty="0" smtClean="0"/>
+              <a:t>	Jean-Roch Maitre</a:t>
+            </a:r>
+          </a:p>
+          <a:p>
+            <a:endParaRPr lang="en-US" dirty="0" smtClean="0"/>
+          </a:p>
+          <a:p>
+            <a:r>
+              <a:rPr lang="en-US" dirty="0"/>
+              <a:t>	</a:t>
+            </a:r>
+            <a:r>
+              <a:rPr lang="en-US" dirty="0" smtClean="0"/>
+              <a:t>Lead Front-End Engineer @ 2600hz</a:t>
+            </a:r>
+            <a:endParaRPr lang="en-US" dirty="0"/>
+          </a:p>
+        </p:txBody>
+      </p:sp>
+      <p:sp>
+        <p:nvSpPr>
+          <p:cNvPr id="4" name="TextBox 3"/>
+          <p:cNvSpPr txBox="1"/>
+          <p:nvPr/>
+        </p:nvSpPr>
+        <p:spPr>
+          <a:xfrm>
+            <a:off x="3218688" y="4531948"/>
+            <a:ext cx="5367528" cy="923330"/>
+          </a:xfrm>
+          <a:prstGeom prst="rect">
+            <a:avLst/>
+          </a:prstGeom>
+          <a:noFill/>
+        </p:spPr>
+        <p:txBody>
+          <a:bodyPr wrap="square" rtlCol="0">
+            <a:spAutoFit/>
+          </a:bodyPr>
+          <a:lstStyle/>
+          <a:p>
+            <a:r>
+              <a:rPr lang="en-US" dirty="0" smtClean="0"/>
+              <a:t>	</a:t>
+            </a:r>
+            <a:r>
+              <a:rPr lang="en-US" dirty="0" err="1" smtClean="0"/>
+              <a:t>Joris</a:t>
+            </a:r>
+            <a:r>
+              <a:rPr lang="en-US" dirty="0" smtClean="0"/>
+              <a:t> Tirado</a:t>
+            </a:r>
+          </a:p>
+          <a:p>
+            <a:endParaRPr lang="en-US" dirty="0" smtClean="0"/>
+          </a:p>
+          <a:p>
+            <a:r>
+              <a:rPr lang="en-US" dirty="0"/>
+              <a:t>	</a:t>
+            </a:r>
+            <a:r>
+              <a:rPr lang="en-US" dirty="0" smtClean="0"/>
+              <a:t>Front-End Engineer @ 2600hz</a:t>
+            </a:r>
+            <a:endParaRPr lang="en-US" dirty="0"/>
+          </a:p>
+        </p:txBody>
+      </p:sp>
+      <p:pic>
+        <p:nvPicPr>
+          <p:cNvPr id="1028" name="Picture 4" descr="1917225_102897743064967_6458239_n.jpg (453×604)"/>
+          <p:cNvPicPr>
+            <a:picLocks noChangeAspect="1" noChangeArrowheads="1"/>
+          </p:cNvPicPr>
+          <p:nvPr/>
+        </p:nvPicPr>
+        <p:blipFill rotWithShape="1">
+          <a:blip r:embed="rId2">
+            <a:extLst>
+              <a:ext uri="{28A0092B-C50C-407E-A947-70E740481C1C}">
+                <a14:useLocalDpi xmlns:a14="http://schemas.microsoft.com/office/drawing/2010/main" val="0"/>
+              </a:ext>
+            </a:extLst>
+          </a:blip>
+          <a:srcRect t="14076" b="6295"/>
+          <a:stretch/>
+        </p:blipFill>
+        <p:spPr bwMode="auto">
+          <a:xfrm>
+            <a:off x="796076" y="3929404"/>
+            <a:ext cx="2184443" cy="2319271"/>
+          </a:xfrm>
+          <a:prstGeom prst="roundRect">
+            <a:avLst>
+              <a:gd name="adj" fmla="val 16667"/>
+            </a:avLst>
+          </a:prstGeom>
+          <a:ln>
+            <a:noFill/>
+          </a:ln>
+          <a:effectLst>
+            <a:outerShdw blurRad="76200" dist="38100" dir="7800000" algn="tl" rotWithShape="0">
+              <a:srgbClr val="000000">
+                <a:alpha val="40000"/>
+              </a:srgbClr>
+            </a:outerShdw>
+          </a:effectLst>
+          <a:scene3d>
+            <a:camera prst="orthographicFront"/>
+            <a:lightRig rig="contrasting" dir="t">
+              <a:rot lat="0" lon="0" rev="4200000"/>
+            </a:lightRig>
+          </a:scene3d>
+          <a:sp3d prstMaterial="plastic">
+            <a:bevelT w="381000" h="114300" prst="relaxedInset"/>
+            <a:contourClr>
+              <a:srgbClr val="969696"/>
+            </a:contourClr>
+          </a:sp3d>
+          <a:extLst>
+            <a:ext uri="{909E8E84-426E-40DD-AFC4-6F175D3DCCD1}">
+              <a14:hiddenFill xmlns:a14="http://schemas.microsoft.com/office/drawing/2010/main">
+                <a:solidFill>
+                  <a:srgbClr val="FFFFFF"/>
+                </a:solidFill>
+              </a14:hiddenFill>
+            </a:ext>
+          </a:extLst>
+        </p:spPr>
+      </p:pic>
+      <p:pic>
+        <p:nvPicPr>
+          <p:cNvPr id="1030" name="Picture 6" descr="194181_1838376711822_3625250_o.jpg (800×600)"/>
+          <p:cNvPicPr>
+            <a:picLocks noChangeAspect="1" noChangeArrowheads="1"/>
+          </p:cNvPicPr>
+          <p:nvPr/>
+        </p:nvPicPr>
+        <p:blipFill rotWithShape="1">
+          <a:blip r:embed="rId3">
+            <a:extLst>
+              <a:ext uri="{28A0092B-C50C-407E-A947-70E740481C1C}">
+                <a14:useLocalDpi xmlns:a14="http://schemas.microsoft.com/office/drawing/2010/main" val="0"/>
+              </a:ext>
+            </a:extLst>
+          </a:blip>
+          <a:srcRect l="43438" t="-320" r="360" b="23840"/>
+          <a:stretch/>
+        </p:blipFill>
+        <p:spPr bwMode="auto">
+          <a:xfrm>
+            <a:off x="796076" y="1074567"/>
+            <a:ext cx="2184443" cy="2229465"/>
+          </a:xfrm>
+          <a:prstGeom prst="roundRect">
+            <a:avLst>
+              <a:gd name="adj" fmla="val 16667"/>
+            </a:avLst>
+          </a:prstGeom>
+          <a:ln>
+            <a:noFill/>
+          </a:ln>
+          <a:effectLst>
+            <a:outerShdw blurRad="76200" dist="38100" dir="7800000" algn="tl" rotWithShape="0">
+              <a:srgbClr val="000000">
+                <a:alpha val="40000"/>
+              </a:srgbClr>
+            </a:outerShdw>
+          </a:effectLst>
+          <a:scene3d>
+            <a:camera prst="orthographicFront"/>
+            <a:lightRig rig="contrasting" dir="t">
+              <a:rot lat="0" lon="0" rev="4200000"/>
+            </a:lightRig>
+          </a:scene3d>
+          <a:sp3d prstMaterial="plastic">
+            <a:bevelT w="381000" h="114300" prst="relaxedInset"/>
+            <a:contourClr>
+              <a:srgbClr val="969696"/>
+            </a:contourClr>
+          </a:sp3d>
+          <a:extLst>
+            <a:ext uri="{909E8E84-426E-40DD-AFC4-6F175D3DCCD1}">
+              <a14:hiddenFill xmlns:a14="http://schemas.microsoft.com/office/drawing/2010/main">
+                <a:solidFill>
+                  <a:srgbClr val="FFFFFF"/>
+                </a:solidFill>
+              </a14:hiddenFill>
+            </a:ext>
+          </a:extLst>
+        </p:spPr>
+      </p:pic>
+    </p:spTree>
+    <p:extLst>
+      <p:ext uri="{BB962C8B-B14F-4D97-AF65-F5344CB8AC3E}">
+        <p14:creationId xmlns:p14="http://schemas.microsoft.com/office/powerpoint/2010/main" val="2310543642"/>
+      </p:ext>
+    </p:extLst>
+  </p:cSld>
+  <p:clrMapOvr>
+    <a:masterClrMapping/>
+  </p:clrMapOvr>
+  <p:timing>
+    <p:tnLst>
+      <p:par>
+        <p:cTn id="1" dur="indefinite" restart="never" nodeType="tmRoot"/>
+      </p:par>
+    </p:tnLst>
+  </p:timing>
+</p:sld>
+</file>
+
+<file path=ppt/slides/slide20.xml><?xml version="1.0" encoding="utf-8"?>
+<p:sld xmlns:a="http://schemas.openxmlformats.org/drawingml/2006/main" xmlns:r="http://schemas.openxmlformats.org/officeDocument/2006/relationships" xmlns:p="http://schemas.openxmlformats.org/presentationml/2006/main">
+  <p:cSld>
+    <p:spTree>
+      <p:nvGrpSpPr>
+        <p:cNvPr id="1" name=""/>
+        <p:cNvGrpSpPr/>
+        <p:nvPr/>
+      </p:nvGrpSpPr>
+      <p:grpSpPr>
+        <a:xfrm>
+          <a:off x="0" y="0"/>
+          <a:ext cx="0" cy="0"/>
+          <a:chOff x="0" y="0"/>
+          <a:chExt cx="0" cy="0"/>
+        </a:xfrm>
+      </p:grpSpPr>
+    </p:spTree>
+    <p:extLst>
+      <p:ext uri="{BB962C8B-B14F-4D97-AF65-F5344CB8AC3E}">
+        <p14:creationId xmlns:p14="http://schemas.microsoft.com/office/powerpoint/2010/main" val="3094102106"/>
+      </p:ext>
+    </p:extLst>
+  </p:cSld>
+  <p:clrMapOvr>
+    <a:masterClrMapping/>
+  </p:clrMapOvr>
+  <p:transition spd="slow">
+    <p:push dir="u"/>
+  </p:transition>
+  <p:timing>
+    <p:tnLst>
+      <p:par>
+        <p:cTn id="1" dur="indefinite" restart="never" nodeType="tmRoot"/>
+      </p:par>
+    </p:tnLst>
+  </p:timing>
+</p:sld>
+</file>
+
+<file path=ppt/slides/slide3.xml><?xml version="1.0" encoding="utf-8"?>
+<p:sld xmlns:a="http://schemas.openxmlformats.org/drawingml/2006/main" xmlns:r="http://schemas.openxmlformats.org/officeDocument/2006/relationships" xmlns:p="http://schemas.openxmlformats.org/presentationml/2006/main">
+  <p:cSld>
+    <p:spTree>
+      <p:nvGrpSpPr>
+        <p:cNvPr id="1" name=""/>
+        <p:cNvGrpSpPr/>
+        <p:nvPr/>
+      </p:nvGrpSpPr>
+      <p:grpSpPr>
+        <a:xfrm>
+          <a:off x="0" y="0"/>
+          <a:ext cx="0" cy="0"/>
+          <a:chOff x="0" y="0"/>
+          <a:chExt cx="0" cy="0"/>
+        </a:xfrm>
+      </p:grpSpPr>
+      <p:sp>
+        <p:nvSpPr>
+          <p:cNvPr id="2" name="Title 1"/>
+          <p:cNvSpPr>
+            <a:spLocks noGrp="1"/>
+          </p:cNvSpPr>
+          <p:nvPr>
+            <p:ph type="title"/>
+          </p:nvPr>
+        </p:nvSpPr>
+        <p:spPr/>
+        <p:txBody>
+          <a:bodyPr/>
+          <a:lstStyle/>
+          <a:p>
+            <a:r>
+              <a:rPr lang="en-US" dirty="0" smtClean="0"/>
+              <a:t>What’s Monster?</a:t>
+            </a:r>
+            <a:endParaRPr lang="en-US" dirty="0"/>
+          </a:p>
+        </p:txBody>
+      </p:sp>
+      <p:sp>
+        <p:nvSpPr>
+          <p:cNvPr id="3" name="TextBox 2"/>
+          <p:cNvSpPr txBox="1"/>
+          <p:nvPr/>
+        </p:nvSpPr>
+        <p:spPr>
+          <a:xfrm>
+            <a:off x="485775" y="1400175"/>
+            <a:ext cx="8043863" cy="4031873"/>
+          </a:xfrm>
+          <a:prstGeom prst="rect">
+            <a:avLst/>
+          </a:prstGeom>
+          <a:noFill/>
+        </p:spPr>
+        <p:txBody>
+          <a:bodyPr wrap="square" rtlCol="0">
+            <a:spAutoFit/>
+          </a:bodyPr>
+          <a:lstStyle/>
+          <a:p>
+            <a:pPr marL="285750" indent="-285750">
+              <a:buFontTx/>
+              <a:buChar char="-"/>
+            </a:pPr>
+            <a:r>
+              <a:rPr lang="en-US" sz="3200" dirty="0" smtClean="0"/>
+              <a:t>New UI developed by 2600hz</a:t>
+            </a:r>
+          </a:p>
+          <a:p>
+            <a:pPr marL="285750" indent="-285750">
+              <a:buFontTx/>
+              <a:buChar char="-"/>
+            </a:pPr>
+            <a:endParaRPr lang="en-US" sz="3200" dirty="0" smtClean="0"/>
+          </a:p>
+          <a:p>
+            <a:pPr marL="285750" indent="-285750">
+              <a:buFontTx/>
+              <a:buChar char="-"/>
+            </a:pPr>
+            <a:r>
+              <a:rPr lang="en-US" sz="3200" dirty="0" smtClean="0"/>
+              <a:t>Responsive for Desktops and Tablets</a:t>
+            </a:r>
+          </a:p>
+          <a:p>
+            <a:pPr marL="285750" indent="-285750">
+              <a:buFontTx/>
+              <a:buChar char="-"/>
+            </a:pPr>
+            <a:endParaRPr lang="en-US" sz="3200" dirty="0" smtClean="0"/>
+          </a:p>
+          <a:p>
+            <a:pPr marL="285750" indent="-285750">
+              <a:buFontTx/>
+              <a:buChar char="-"/>
+            </a:pPr>
+            <a:r>
+              <a:rPr lang="en-US" sz="3200" dirty="0" err="1" smtClean="0"/>
+              <a:t>Internationalizable</a:t>
+            </a:r>
+            <a:r>
+              <a:rPr lang="en-US" sz="3200" dirty="0" smtClean="0"/>
+              <a:t> (already available in English and French)</a:t>
+            </a:r>
+          </a:p>
+          <a:p>
+            <a:pPr marL="285750" indent="-285750">
+              <a:buFontTx/>
+              <a:buChar char="-"/>
+            </a:pPr>
+            <a:endParaRPr lang="en-US" sz="3200" dirty="0" smtClean="0"/>
+          </a:p>
+          <a:p>
+            <a:pPr marL="285750" indent="-285750">
+              <a:buFontTx/>
+              <a:buChar char="-"/>
+            </a:pPr>
+            <a:r>
+              <a:rPr lang="en-US" sz="3200" dirty="0" smtClean="0"/>
+              <a:t>Developer-friendly (app store, widgets, SDK)</a:t>
+            </a:r>
+            <a:endParaRPr lang="en-US" sz="3200" dirty="0"/>
+          </a:p>
+        </p:txBody>
+      </p:sp>
+    </p:spTree>
+    <p:extLst>
+      <p:ext uri="{BB962C8B-B14F-4D97-AF65-F5344CB8AC3E}">
+        <p14:creationId xmlns:p14="http://schemas.microsoft.com/office/powerpoint/2010/main" val="950094953"/>
+      </p:ext>
+    </p:extLst>
+  </p:cSld>
+  <p:clrMapOvr>
+    <a:masterClrMapping/>
+  </p:clrMapOvr>
+  <p:transition spd="slow">
+    <p:push dir="u"/>
+  </p:transition>
+  <p:timing>
+    <p:tnLst>
+      <p:par>
+        <p:cTn id="1" dur="indefinite" restart="never" nodeType="tmRoot"/>
+      </p:par>
+    </p:tnLst>
+  </p:timing>
+</p:sld>
+</file>
+
+<file path=ppt/slides/slide4.xml><?xml version="1.0" encoding="utf-8"?>
+<p:sld xmlns:a="http://schemas.openxmlformats.org/drawingml/2006/main" xmlns:r="http://schemas.openxmlformats.org/officeDocument/2006/relationships" xmlns:p="http://schemas.openxmlformats.org/presentationml/2006/main">
+  <p:cSld>
+    <p:spTree>
+      <p:nvGrpSpPr>
+        <p:cNvPr id="1" name=""/>
+        <p:cNvGrpSpPr/>
+        <p:nvPr/>
+      </p:nvGrpSpPr>
+      <p:grpSpPr>
+        <a:xfrm>
+          <a:off x="0" y="0"/>
+          <a:ext cx="0" cy="0"/>
+          <a:chOff x="0" y="0"/>
+          <a:chExt cx="0" cy="0"/>
+        </a:xfrm>
+      </p:grpSpPr>
+      <p:sp>
+        <p:nvSpPr>
+          <p:cNvPr id="2" name="Title 1"/>
+          <p:cNvSpPr>
+            <a:spLocks noGrp="1"/>
+          </p:cNvSpPr>
+          <p:nvPr>
+            <p:ph type="title"/>
+          </p:nvPr>
+        </p:nvSpPr>
+        <p:spPr/>
+        <p:txBody>
+          <a:bodyPr/>
+          <a:lstStyle/>
+          <a:p>
+            <a:r>
+              <a:rPr lang="en-US" dirty="0" smtClean="0"/>
+              <a:t>What’s a Monster app?</a:t>
+            </a:r>
+            <a:endParaRPr lang="en-US" dirty="0"/>
+          </a:p>
+        </p:txBody>
+      </p:sp>
+      <p:pic>
+        <p:nvPicPr>
+          <p:cNvPr id="5" name="Picture 4"/>
+          <p:cNvPicPr>
+            <a:picLocks noChangeAspect="1"/>
+          </p:cNvPicPr>
+          <p:nvPr/>
+        </p:nvPicPr>
+        <p:blipFill>
+          <a:blip r:embed="rId2"/>
+          <a:stretch>
+            <a:fillRect/>
+          </a:stretch>
+        </p:blipFill>
+        <p:spPr>
+          <a:xfrm>
+            <a:off x="1439989" y="1192720"/>
+            <a:ext cx="5953125" cy="5057775"/>
+          </a:xfrm>
+          <a:prstGeom prst="rect">
+            <a:avLst/>
+          </a:prstGeom>
+        </p:spPr>
+      </p:pic>
+    </p:spTree>
+    <p:extLst>
+      <p:ext uri="{BB962C8B-B14F-4D97-AF65-F5344CB8AC3E}">
+        <p14:creationId xmlns:p14="http://schemas.microsoft.com/office/powerpoint/2010/main" val="103665162"/>
+      </p:ext>
+    </p:extLst>
+  </p:cSld>
+  <p:clrMapOvr>
+    <a:masterClrMapping/>
+  </p:clrMapOvr>
+  <p:transition spd="slow">
+    <p:push dir="u"/>
+  </p:transition>
   <p:timing>
     <p:tnLst>
       <p:par>
@@ -2061,14 +3708,37 @@
       </p:grpSpPr>
       <p:sp>
         <p:nvSpPr>
-          <p:cNvPr id="2" name="TextBox 1"/>
+          <p:cNvPr id="2" name="Title 1"/>
+          <p:cNvSpPr>
+            <a:spLocks noGrp="1"/>
+          </p:cNvSpPr>
+          <p:nvPr>
+            <p:ph type="title"/>
+          </p:nvPr>
+        </p:nvSpPr>
+        <p:spPr/>
+        <p:txBody>
+          <a:bodyPr/>
+          <a:lstStyle/>
+          <a:p>
+            <a:r>
+              <a:rPr lang="en-US" dirty="0" smtClean="0"/>
+              <a:t>What’s in the app we’re about to code?</a:t>
+            </a:r>
+            <a:endParaRPr lang="en-US" dirty="0"/>
+          </a:p>
+        </p:txBody>
+      </p:sp>
+      <p:sp>
+        <p:nvSpPr>
+          <p:cNvPr id="3" name="TextBox 2"/>
           <p:cNvSpPr txBox="1"/>
           <p:nvPr/>
         </p:nvSpPr>
         <p:spPr>
           <a:xfrm>
-            <a:off x="2328863" y="3771900"/>
-            <a:ext cx="4457700" cy="369332"/>
+            <a:off x="338328" y="1325880"/>
+            <a:ext cx="8165592" cy="5016758"/>
           </a:xfrm>
           <a:prstGeom prst="rect">
             <a:avLst/>
@@ -2081,33 +3751,709 @@
           </a:bodyPr>
           <a:lstStyle/>
           <a:p>
-            <a:pPr algn="ctr"/>
-            <a:r>
-              <a:rPr lang="en-US" dirty="0" smtClean="0">
-                <a:solidFill>
-                  <a:schemeClr val="bg1"/>
-                </a:solidFill>
-              </a:rPr>
-              <a:t>(and go get some drinks!)</a:t>
-            </a:r>
-            <a:endParaRPr lang="en-US" dirty="0">
-              <a:solidFill>
-                <a:schemeClr val="bg1"/>
-              </a:solidFill>
-            </a:endParaRPr>
+            <a:pPr marL="285750" indent="-285750">
+              <a:buFontTx/>
+              <a:buChar char="-"/>
+            </a:pPr>
+            <a:r>
+              <a:rPr lang="en-US" sz="3200" dirty="0" smtClean="0"/>
+              <a:t>We want to show you the basics of coding a Monster app, so we’ll keep it simple!</a:t>
+            </a:r>
+          </a:p>
+          <a:p>
+            <a:pPr marL="285750" indent="-285750">
+              <a:buFontTx/>
+              <a:buChar char="-"/>
+            </a:pPr>
+            <a:endParaRPr lang="en-US" sz="3200" dirty="0"/>
+          </a:p>
+          <a:p>
+            <a:pPr marL="285750" indent="-285750">
+              <a:buFontTx/>
+              <a:buChar char="-"/>
+            </a:pPr>
+            <a:endParaRPr lang="en-US" sz="3200" dirty="0" smtClean="0"/>
+          </a:p>
+          <a:p>
+            <a:pPr marL="285750" indent="-285750">
+              <a:buFontTx/>
+              <a:buChar char="-"/>
+            </a:pPr>
+            <a:r>
+              <a:rPr lang="en-US" sz="3200" dirty="0" smtClean="0"/>
+              <a:t>The app will try to track all new call events happening on a Kazoo Account</a:t>
+            </a:r>
+          </a:p>
+          <a:p>
+            <a:pPr marL="285750" indent="-285750">
+              <a:buFontTx/>
+              <a:buChar char="-"/>
+            </a:pPr>
+            <a:endParaRPr lang="en-US" sz="3200" dirty="0"/>
+          </a:p>
+          <a:p>
+            <a:pPr marL="285750" indent="-285750">
+              <a:buFontTx/>
+              <a:buChar char="-"/>
+            </a:pPr>
+            <a:endParaRPr lang="en-US" sz="3200" dirty="0" smtClean="0"/>
+          </a:p>
+          <a:p>
+            <a:pPr marL="285750" indent="-285750">
+              <a:buFontTx/>
+              <a:buChar char="-"/>
+            </a:pPr>
+            <a:r>
+              <a:rPr lang="en-US" sz="3200" dirty="0" smtClean="0"/>
+              <a:t>The goal is to see the events in our app as we place calls from a softphone!</a:t>
+            </a:r>
           </a:p>
         </p:txBody>
       </p:sp>
     </p:spTree>
     <p:extLst>
       <p:ext uri="{BB962C8B-B14F-4D97-AF65-F5344CB8AC3E}">
-        <p14:creationId xmlns:p14="http://schemas.microsoft.com/office/powerpoint/2010/main" val="3094102106"/>
+        <p14:creationId xmlns:p14="http://schemas.microsoft.com/office/powerpoint/2010/main" val="442099579"/>
       </p:ext>
     </p:extLst>
   </p:cSld>
   <p:clrMapOvr>
     <a:masterClrMapping/>
   </p:clrMapOvr>
+  <p:transition spd="slow">
+    <p:push dir="u"/>
+  </p:transition>
+  <p:timing>
+    <p:tnLst>
+      <p:par>
+        <p:cTn id="1" dur="indefinite" restart="never" nodeType="tmRoot"/>
+      </p:par>
+    </p:tnLst>
+  </p:timing>
+</p:sld>
+</file>
+
+<file path=ppt/slides/slide6.xml><?xml version="1.0" encoding="utf-8"?>
+<p:sld xmlns:a="http://schemas.openxmlformats.org/drawingml/2006/main" xmlns:r="http://schemas.openxmlformats.org/officeDocument/2006/relationships" xmlns:p="http://schemas.openxmlformats.org/presentationml/2006/main">
+  <p:cSld>
+    <p:spTree>
+      <p:nvGrpSpPr>
+        <p:cNvPr id="1" name=""/>
+        <p:cNvGrpSpPr/>
+        <p:nvPr/>
+      </p:nvGrpSpPr>
+      <p:grpSpPr>
+        <a:xfrm>
+          <a:off x="0" y="0"/>
+          <a:ext cx="0" cy="0"/>
+          <a:chOff x="0" y="0"/>
+          <a:chExt cx="0" cy="0"/>
+        </a:xfrm>
+      </p:grpSpPr>
+      <p:sp>
+        <p:nvSpPr>
+          <p:cNvPr id="2" name="Title 1"/>
+          <p:cNvSpPr>
+            <a:spLocks noGrp="1"/>
+          </p:cNvSpPr>
+          <p:nvPr>
+            <p:ph type="title"/>
+          </p:nvPr>
+        </p:nvSpPr>
+        <p:spPr/>
+        <p:txBody>
+          <a:bodyPr/>
+          <a:lstStyle/>
+          <a:p>
+            <a:r>
+              <a:rPr lang="en-US" dirty="0" smtClean="0"/>
+              <a:t>Requirements</a:t>
+            </a:r>
+            <a:endParaRPr lang="en-US" dirty="0"/>
+          </a:p>
+        </p:txBody>
+      </p:sp>
+      <p:sp>
+        <p:nvSpPr>
+          <p:cNvPr id="3" name="TextBox 2"/>
+          <p:cNvSpPr txBox="1"/>
+          <p:nvPr/>
+        </p:nvSpPr>
+        <p:spPr>
+          <a:xfrm>
+            <a:off x="576072" y="1444752"/>
+            <a:ext cx="6153912" cy="3785652"/>
+          </a:xfrm>
+          <a:prstGeom prst="rect">
+            <a:avLst/>
+          </a:prstGeom>
+          <a:noFill/>
+        </p:spPr>
+        <p:txBody>
+          <a:bodyPr wrap="square" rtlCol="0">
+            <a:spAutoFit/>
+          </a:bodyPr>
+          <a:lstStyle/>
+          <a:p>
+            <a:pPr marL="342900" indent="-342900">
+              <a:buFontTx/>
+              <a:buChar char="-"/>
+            </a:pPr>
+            <a:r>
+              <a:rPr lang="en-US" sz="2400" dirty="0" smtClean="0"/>
+              <a:t>Have access to a local Monster-UI </a:t>
+            </a:r>
+          </a:p>
+          <a:p>
+            <a:pPr marL="342900" indent="-342900">
+              <a:buFontTx/>
+              <a:buChar char="-"/>
+            </a:pPr>
+            <a:endParaRPr lang="en-US" sz="2400" dirty="0" smtClean="0"/>
+          </a:p>
+          <a:p>
+            <a:endParaRPr lang="en-US" sz="2400" dirty="0"/>
+          </a:p>
+          <a:p>
+            <a:pPr marL="342900" indent="-342900">
+              <a:buFontTx/>
+              <a:buChar char="-"/>
+            </a:pPr>
+            <a:r>
+              <a:rPr lang="en-US" sz="2400" dirty="0" smtClean="0"/>
+              <a:t>Have credentials to log in to your UI</a:t>
+            </a:r>
+          </a:p>
+          <a:p>
+            <a:pPr marL="342900" indent="-342900">
+              <a:buFontTx/>
+              <a:buChar char="-"/>
+            </a:pPr>
+            <a:endParaRPr lang="en-US" sz="2400" dirty="0" smtClean="0"/>
+          </a:p>
+          <a:p>
+            <a:pPr marL="342900" indent="-342900">
+              <a:buFontTx/>
+              <a:buChar char="-"/>
+            </a:pPr>
+            <a:endParaRPr lang="en-US" sz="2400" dirty="0" smtClean="0"/>
+          </a:p>
+          <a:p>
+            <a:pPr marL="342900" indent="-342900">
+              <a:buFontTx/>
+              <a:buChar char="-"/>
+            </a:pPr>
+            <a:r>
+              <a:rPr lang="en-US" sz="2400" dirty="0" smtClean="0"/>
+              <a:t>Have a softphone registered to this account</a:t>
+            </a:r>
+          </a:p>
+          <a:p>
+            <a:pPr marL="342900" indent="-342900">
+              <a:buFontTx/>
+              <a:buChar char="-"/>
+            </a:pPr>
+            <a:endParaRPr lang="en-US" sz="2400" dirty="0" smtClean="0"/>
+          </a:p>
+          <a:p>
+            <a:pPr marL="342900" indent="-342900">
+              <a:buFontTx/>
+              <a:buChar char="-"/>
+            </a:pPr>
+            <a:endParaRPr lang="en-US" sz="2400" dirty="0"/>
+          </a:p>
+          <a:p>
+            <a:pPr marL="342900" indent="-342900">
+              <a:buFontTx/>
+              <a:buChar char="-"/>
+            </a:pPr>
+            <a:r>
+              <a:rPr lang="en-US" sz="2400" dirty="0" smtClean="0"/>
+              <a:t>Be able to edit some code!</a:t>
+            </a:r>
+            <a:endParaRPr lang="en-US" sz="2400" dirty="0"/>
+          </a:p>
+        </p:txBody>
+      </p:sp>
+    </p:spTree>
+    <p:extLst>
+      <p:ext uri="{BB962C8B-B14F-4D97-AF65-F5344CB8AC3E}">
+        <p14:creationId xmlns:p14="http://schemas.microsoft.com/office/powerpoint/2010/main" val="3347316149"/>
+      </p:ext>
+    </p:extLst>
+  </p:cSld>
+  <p:clrMapOvr>
+    <a:masterClrMapping/>
+  </p:clrMapOvr>
+  <p:transition spd="slow">
+    <p:push dir="u"/>
+  </p:transition>
+  <p:timing>
+    <p:tnLst>
+      <p:par>
+        <p:cTn id="1" dur="indefinite" restart="never" nodeType="tmRoot"/>
+      </p:par>
+    </p:tnLst>
+  </p:timing>
+</p:sld>
+</file>
+
+<file path=ppt/slides/slide7.xml><?xml version="1.0" encoding="utf-8"?>
+<p:sld xmlns:a="http://schemas.openxmlformats.org/drawingml/2006/main" xmlns:r="http://schemas.openxmlformats.org/officeDocument/2006/relationships" xmlns:p="http://schemas.openxmlformats.org/presentationml/2006/main">
+  <p:cSld>
+    <p:spTree>
+      <p:nvGrpSpPr>
+        <p:cNvPr id="1" name=""/>
+        <p:cNvGrpSpPr/>
+        <p:nvPr/>
+      </p:nvGrpSpPr>
+      <p:grpSpPr>
+        <a:xfrm>
+          <a:off x="0" y="0"/>
+          <a:ext cx="0" cy="0"/>
+          <a:chOff x="0" y="0"/>
+          <a:chExt cx="0" cy="0"/>
+        </a:xfrm>
+      </p:grpSpPr>
+      <p:sp>
+        <p:nvSpPr>
+          <p:cNvPr id="2" name="Title 1"/>
+          <p:cNvSpPr>
+            <a:spLocks noGrp="1"/>
+          </p:cNvSpPr>
+          <p:nvPr>
+            <p:ph type="title"/>
+          </p:nvPr>
+        </p:nvSpPr>
+        <p:spPr/>
+        <p:txBody>
+          <a:bodyPr/>
+          <a:lstStyle/>
+          <a:p>
+            <a:r>
+              <a:rPr lang="en-US" dirty="0" smtClean="0"/>
+              <a:t>Launching the Monster</a:t>
+            </a:r>
+            <a:endParaRPr lang="en-US" dirty="0"/>
+          </a:p>
+        </p:txBody>
+      </p:sp>
+      <p:sp>
+        <p:nvSpPr>
+          <p:cNvPr id="3" name="TextBox 2"/>
+          <p:cNvSpPr txBox="1"/>
+          <p:nvPr/>
+        </p:nvSpPr>
+        <p:spPr>
+          <a:xfrm>
+            <a:off x="448056" y="1231701"/>
+            <a:ext cx="8458200" cy="1754326"/>
+          </a:xfrm>
+          <a:prstGeom prst="rect">
+            <a:avLst/>
+          </a:prstGeom>
+          <a:noFill/>
+        </p:spPr>
+        <p:txBody>
+          <a:bodyPr wrap="square" rtlCol="0">
+            <a:spAutoFit/>
+          </a:bodyPr>
+          <a:lstStyle/>
+          <a:p>
+            <a:pPr marL="285750" indent="-285750">
+              <a:buFontTx/>
+              <a:buChar char="-"/>
+            </a:pPr>
+            <a:r>
+              <a:rPr lang="en-US" sz="2400" dirty="0" smtClean="0"/>
+              <a:t>Go at the address of your local Monster-UI</a:t>
+            </a:r>
+          </a:p>
+          <a:p>
+            <a:pPr marL="285750" indent="-285750">
+              <a:buFontTx/>
+              <a:buChar char="-"/>
+            </a:pPr>
+            <a:endParaRPr lang="en-US" sz="2400" dirty="0"/>
+          </a:p>
+          <a:p>
+            <a:pPr marL="285750" indent="-285750">
+              <a:buFontTx/>
+              <a:buChar char="-"/>
+            </a:pPr>
+            <a:r>
+              <a:rPr lang="en-US" sz="2400" dirty="0" smtClean="0"/>
+              <a:t>Log in with the credentials given to you this morning</a:t>
+            </a:r>
+          </a:p>
+          <a:p>
+            <a:pPr marL="285750" indent="-285750">
+              <a:buFontTx/>
+              <a:buChar char="-"/>
+            </a:pPr>
+            <a:endParaRPr lang="en-US" dirty="0"/>
+          </a:p>
+          <a:p>
+            <a:pPr marL="285750" indent="-285750">
+              <a:buFontTx/>
+              <a:buChar char="-"/>
+            </a:pPr>
+            <a:endParaRPr lang="en-US" dirty="0"/>
+          </a:p>
+        </p:txBody>
+      </p:sp>
+      <p:pic>
+        <p:nvPicPr>
+          <p:cNvPr id="5" name="Picture 4"/>
+          <p:cNvPicPr>
+            <a:picLocks noChangeAspect="1"/>
+          </p:cNvPicPr>
+          <p:nvPr/>
+        </p:nvPicPr>
+        <p:blipFill>
+          <a:blip r:embed="rId2"/>
+          <a:stretch>
+            <a:fillRect/>
+          </a:stretch>
+        </p:blipFill>
+        <p:spPr>
+          <a:xfrm>
+            <a:off x="1417320" y="3355359"/>
+            <a:ext cx="5279898" cy="3264706"/>
+          </a:xfrm>
+          <a:prstGeom prst="rect">
+            <a:avLst/>
+          </a:prstGeom>
+        </p:spPr>
+      </p:pic>
+    </p:spTree>
+    <p:extLst>
+      <p:ext uri="{BB962C8B-B14F-4D97-AF65-F5344CB8AC3E}">
+        <p14:creationId xmlns:p14="http://schemas.microsoft.com/office/powerpoint/2010/main" val="1207052285"/>
+      </p:ext>
+    </p:extLst>
+  </p:cSld>
+  <p:clrMapOvr>
+    <a:masterClrMapping/>
+  </p:clrMapOvr>
+  <p:transition spd="slow">
+    <p:push dir="u"/>
+  </p:transition>
+  <p:timing>
+    <p:tnLst>
+      <p:par>
+        <p:cTn id="1" dur="indefinite" restart="never" nodeType="tmRoot"/>
+      </p:par>
+    </p:tnLst>
+  </p:timing>
+</p:sld>
+</file>
+
+<file path=ppt/slides/slide8.xml><?xml version="1.0" encoding="utf-8"?>
+<p:sld xmlns:a="http://schemas.openxmlformats.org/drawingml/2006/main" xmlns:r="http://schemas.openxmlformats.org/officeDocument/2006/relationships" xmlns:p="http://schemas.openxmlformats.org/presentationml/2006/main">
+  <p:cSld>
+    <p:spTree>
+      <p:nvGrpSpPr>
+        <p:cNvPr id="1" name=""/>
+        <p:cNvGrpSpPr/>
+        <p:nvPr/>
+      </p:nvGrpSpPr>
+      <p:grpSpPr>
+        <a:xfrm>
+          <a:off x="0" y="0"/>
+          <a:ext cx="0" cy="0"/>
+          <a:chOff x="0" y="0"/>
+          <a:chExt cx="0" cy="0"/>
+        </a:xfrm>
+      </p:grpSpPr>
+      <p:sp>
+        <p:nvSpPr>
+          <p:cNvPr id="2" name="Title 1"/>
+          <p:cNvSpPr>
+            <a:spLocks noGrp="1"/>
+          </p:cNvSpPr>
+          <p:nvPr>
+            <p:ph type="title"/>
+          </p:nvPr>
+        </p:nvSpPr>
+        <p:spPr/>
+        <p:txBody>
+          <a:bodyPr/>
+          <a:lstStyle/>
+          <a:p>
+            <a:r>
+              <a:rPr lang="en-US" dirty="0" smtClean="0"/>
+              <a:t>Creating the demo app folder</a:t>
+            </a:r>
+            <a:endParaRPr lang="en-US" dirty="0"/>
+          </a:p>
+        </p:txBody>
+      </p:sp>
+      <p:pic>
+        <p:nvPicPr>
+          <p:cNvPr id="4" name="Picture 3"/>
+          <p:cNvPicPr>
+            <a:picLocks noChangeAspect="1"/>
+          </p:cNvPicPr>
+          <p:nvPr/>
+        </p:nvPicPr>
+        <p:blipFill>
+          <a:blip r:embed="rId2"/>
+          <a:stretch>
+            <a:fillRect/>
+          </a:stretch>
+        </p:blipFill>
+        <p:spPr>
+          <a:xfrm>
+            <a:off x="1858327" y="1472374"/>
+            <a:ext cx="5610225" cy="4267200"/>
+          </a:xfrm>
+          <a:prstGeom prst="rect">
+            <a:avLst/>
+          </a:prstGeom>
+        </p:spPr>
+      </p:pic>
+    </p:spTree>
+    <p:extLst>
+      <p:ext uri="{BB962C8B-B14F-4D97-AF65-F5344CB8AC3E}">
+        <p14:creationId xmlns:p14="http://schemas.microsoft.com/office/powerpoint/2010/main" val="1420030135"/>
+      </p:ext>
+    </p:extLst>
+  </p:cSld>
+  <p:clrMapOvr>
+    <a:masterClrMapping/>
+  </p:clrMapOvr>
+  <p:transition spd="slow">
+    <p:push dir="u"/>
+  </p:transition>
+  <p:timing>
+    <p:tnLst>
+      <p:par>
+        <p:cTn id="1" dur="indefinite" restart="never" nodeType="tmRoot"/>
+      </p:par>
+    </p:tnLst>
+  </p:timing>
+</p:sld>
+</file>
+
+<file path=ppt/slides/slide9.xml><?xml version="1.0" encoding="utf-8"?>
+<p:sld xmlns:a="http://schemas.openxmlformats.org/drawingml/2006/main" xmlns:r="http://schemas.openxmlformats.org/officeDocument/2006/relationships" xmlns:p="http://schemas.openxmlformats.org/presentationml/2006/main">
+  <p:cSld>
+    <p:spTree>
+      <p:nvGrpSpPr>
+        <p:cNvPr id="1" name=""/>
+        <p:cNvGrpSpPr/>
+        <p:nvPr/>
+      </p:nvGrpSpPr>
+      <p:grpSpPr>
+        <a:xfrm>
+          <a:off x="0" y="0"/>
+          <a:ext cx="0" cy="0"/>
+          <a:chOff x="0" y="0"/>
+          <a:chExt cx="0" cy="0"/>
+        </a:xfrm>
+      </p:grpSpPr>
+      <p:sp>
+        <p:nvSpPr>
+          <p:cNvPr id="2" name="Title 1"/>
+          <p:cNvSpPr>
+            <a:spLocks noGrp="1"/>
+          </p:cNvSpPr>
+          <p:nvPr>
+            <p:ph type="title"/>
+          </p:nvPr>
+        </p:nvSpPr>
+        <p:spPr/>
+        <p:txBody>
+          <a:bodyPr/>
+          <a:lstStyle/>
+          <a:p>
+            <a:r>
+              <a:rPr lang="en-US" dirty="0" smtClean="0"/>
+              <a:t>Understanding my app folder</a:t>
+            </a:r>
+            <a:endParaRPr lang="en-US" dirty="0"/>
+          </a:p>
+        </p:txBody>
+      </p:sp>
+      <p:pic>
+        <p:nvPicPr>
+          <p:cNvPr id="3" name="Picture 2"/>
+          <p:cNvPicPr>
+            <a:picLocks noChangeAspect="1"/>
+          </p:cNvPicPr>
+          <p:nvPr/>
+        </p:nvPicPr>
+        <p:blipFill>
+          <a:blip r:embed="rId2"/>
+          <a:stretch>
+            <a:fillRect/>
+          </a:stretch>
+        </p:blipFill>
+        <p:spPr>
+          <a:xfrm>
+            <a:off x="325183" y="1230248"/>
+            <a:ext cx="3710482" cy="4201287"/>
+          </a:xfrm>
+          <a:prstGeom prst="rect">
+            <a:avLst/>
+          </a:prstGeom>
+        </p:spPr>
+      </p:pic>
+      <p:sp>
+        <p:nvSpPr>
+          <p:cNvPr id="4" name="TextBox 3"/>
+          <p:cNvSpPr txBox="1"/>
+          <p:nvPr/>
+        </p:nvSpPr>
+        <p:spPr>
+          <a:xfrm>
+            <a:off x="4553712" y="1362456"/>
+            <a:ext cx="3858768" cy="3970318"/>
+          </a:xfrm>
+          <a:prstGeom prst="rect">
+            <a:avLst/>
+          </a:prstGeom>
+          <a:noFill/>
+        </p:spPr>
+        <p:txBody>
+          <a:bodyPr wrap="square" rtlCol="0">
+            <a:spAutoFit/>
+          </a:bodyPr>
+          <a:lstStyle/>
+          <a:p>
+            <a:pPr marL="285750" indent="-285750">
+              <a:buFontTx/>
+              <a:buChar char="-"/>
+            </a:pPr>
+            <a:endParaRPr lang="en-US" dirty="0" smtClean="0"/>
+          </a:p>
+          <a:p>
+            <a:pPr marL="285750" indent="-285750">
+              <a:buFontTx/>
+              <a:buChar char="-"/>
+            </a:pPr>
+            <a:r>
+              <a:rPr lang="en-US" dirty="0" smtClean="0"/>
+              <a:t>I18n strings in /i18n</a:t>
+            </a:r>
+          </a:p>
+          <a:p>
+            <a:pPr marL="285750" indent="-285750">
+              <a:buFontTx/>
+              <a:buChar char="-"/>
+            </a:pPr>
+            <a:endParaRPr lang="en-US" dirty="0"/>
+          </a:p>
+          <a:p>
+            <a:pPr marL="285750" indent="-285750">
+              <a:buFontTx/>
+              <a:buChar char="-"/>
+            </a:pPr>
+            <a:endParaRPr lang="en-US" dirty="0" smtClean="0"/>
+          </a:p>
+          <a:p>
+            <a:pPr marL="285750" indent="-285750">
+              <a:buFontTx/>
+              <a:buChar char="-"/>
+            </a:pPr>
+            <a:endParaRPr lang="en-US" dirty="0"/>
+          </a:p>
+          <a:p>
+            <a:pPr marL="285750" indent="-285750">
+              <a:buFontTx/>
+              <a:buChar char="-"/>
+            </a:pPr>
+            <a:endParaRPr lang="en-US" dirty="0" smtClean="0"/>
+          </a:p>
+          <a:p>
+            <a:pPr marL="285750" indent="-285750">
+              <a:buFontTx/>
+              <a:buChar char="-"/>
+            </a:pPr>
+            <a:endParaRPr lang="en-US" dirty="0" smtClean="0"/>
+          </a:p>
+          <a:p>
+            <a:pPr marL="285750" indent="-285750">
+              <a:buFontTx/>
+              <a:buChar char="-"/>
+            </a:pPr>
+            <a:r>
+              <a:rPr lang="en-US" dirty="0"/>
+              <a:t>HTML in the /views</a:t>
+            </a:r>
+          </a:p>
+          <a:p>
+            <a:pPr marL="285750" indent="-285750">
+              <a:buFontTx/>
+              <a:buChar char="-"/>
+            </a:pPr>
+            <a:endParaRPr lang="en-US" dirty="0" smtClean="0"/>
+          </a:p>
+          <a:p>
+            <a:pPr marL="285750" indent="-285750">
+              <a:buFontTx/>
+              <a:buChar char="-"/>
+            </a:pPr>
+            <a:endParaRPr lang="en-US" dirty="0"/>
+          </a:p>
+          <a:p>
+            <a:pPr marL="285750" indent="-285750">
+              <a:buFontTx/>
+              <a:buChar char="-"/>
+            </a:pPr>
+            <a:endParaRPr lang="en-US" dirty="0" smtClean="0"/>
+          </a:p>
+          <a:p>
+            <a:pPr marL="285750" indent="-285750">
+              <a:buFontTx/>
+              <a:buChar char="-"/>
+            </a:pPr>
+            <a:r>
+              <a:rPr lang="en-US" dirty="0" smtClean="0"/>
+              <a:t>CSS in app.css</a:t>
+            </a:r>
+          </a:p>
+          <a:p>
+            <a:pPr marL="285750" indent="-285750">
+              <a:buFontTx/>
+              <a:buChar char="-"/>
+            </a:pPr>
+            <a:endParaRPr lang="en-US" dirty="0" smtClean="0"/>
+          </a:p>
+          <a:p>
+            <a:pPr marL="285750" indent="-285750">
+              <a:buFontTx/>
+              <a:buChar char="-"/>
+            </a:pPr>
+            <a:r>
+              <a:rPr lang="en-US" dirty="0" smtClean="0"/>
+              <a:t>The magic in app.js!</a:t>
+            </a:r>
+            <a:endParaRPr lang="en-US" dirty="0"/>
+          </a:p>
+        </p:txBody>
+      </p:sp>
+    </p:spTree>
+    <p:extLst>
+      <p:ext uri="{BB962C8B-B14F-4D97-AF65-F5344CB8AC3E}">
+        <p14:creationId xmlns:p14="http://schemas.microsoft.com/office/powerpoint/2010/main" val="1912287753"/>
+      </p:ext>
+    </p:extLst>
+  </p:cSld>
+  <p:clrMapOvr>
+    <a:masterClrMapping/>
+  </p:clrMapOvr>
+  <p:transition spd="slow">
+    <p:push dir="u"/>
+  </p:transition>
+  <p:timing>
+    <p:tnLst>
+      <p:par>
+        <p:cTn id="1" dur="indefinite" restart="never" nodeType="tmRoot"/>
+      </p:par>
+    </p:tnLst>
+  </p:timing>
 </p:sld>
 </file>
 

</xml_diff>

<commit_message>
UI-753: Add transition and correct typos
</commit_message>
<xml_diff>
--- a/apps/demo_done/presentation.pptx
+++ b/apps/demo_done/presentation.pptx
@@ -2822,12 +2822,8 @@
           <a:lstStyle/>
           <a:p>
             <a:r>
-              <a:rPr lang="en-US" dirty="0" smtClean="0"/>
-              <a:t>Jean-Roch </a:t>
-            </a:r>
-            <a:r>
-              <a:rPr lang="en-US" dirty="0" smtClean="0"/>
-              <a:t>Maitre</a:t>
+              <a:rPr lang="en-US" sz="1400" dirty="0" smtClean="0"/>
+              <a:t>Jean-Roch Maitre</a:t>
             </a:r>
           </a:p>
           <a:p>
@@ -2837,10 +2833,10 @@
               </a:lnSpc>
             </a:pPr>
             <a:r>
-              <a:rPr lang="en-US" dirty="0" smtClean="0"/>
+              <a:rPr lang="en-US" sz="1400" dirty="0" smtClean="0"/>
               <a:t>Joris Tirado</a:t>
             </a:r>
-            <a:endParaRPr lang="en-US" dirty="0"/>
+            <a:endParaRPr lang="en-US" sz="1400" dirty="0"/>
           </a:p>
         </p:txBody>
       </p:sp>
@@ -3154,12 +3150,16 @@
               <a:t>Copy the HTML block on the </a:t>
             </a:r>
             <a:r>
-              <a:rPr lang="en-US" sz="2400" dirty="0" err="1" smtClean="0"/>
-              <a:t>github</a:t>
-            </a:r>
-            <a:r>
               <a:rPr lang="en-US" sz="2400" dirty="0" smtClean="0"/>
-              <a:t> page</a:t>
+              <a:t>GitHub</a:t>
+            </a:r>
+            <a:r>
+              <a:rPr lang="en-US" sz="2400" dirty="0" smtClean="0"/>
+              <a:t> </a:t>
+            </a:r>
+            <a:r>
+              <a:rPr lang="en-US" sz="2400" dirty="0" smtClean="0"/>
+              <a:t>page</a:t>
             </a:r>
           </a:p>
           <a:p>
@@ -3168,7 +3168,15 @@
             </a:pPr>
             <a:r>
               <a:rPr lang="en-US" sz="2400" dirty="0" smtClean="0"/>
-              <a:t>Paste it in your layout.html, and Save the file!</a:t>
+              <a:t>Paste it in your layout.html, and </a:t>
+            </a:r>
+            <a:r>
+              <a:rPr lang="en-US" sz="2400" dirty="0" smtClean="0"/>
+              <a:t>save </a:t>
+            </a:r>
+            <a:r>
+              <a:rPr lang="en-US" sz="2400" dirty="0" smtClean="0"/>
+              <a:t>the file!</a:t>
             </a:r>
           </a:p>
           <a:p>
@@ -3183,7 +3191,15 @@
             </a:pPr>
             <a:r>
               <a:rPr lang="en-US" sz="2400" dirty="0" smtClean="0"/>
-              <a:t>We need to get the I18n strings as well!</a:t>
+              <a:t>We need to get the </a:t>
+            </a:r>
+            <a:r>
+              <a:rPr lang="en-US" sz="2400" dirty="0" smtClean="0"/>
+              <a:t>i18n </a:t>
+            </a:r>
+            <a:r>
+              <a:rPr lang="en-US" sz="2400" dirty="0" smtClean="0"/>
+              <a:t>strings as well!</a:t>
             </a:r>
           </a:p>
           <a:p>
@@ -3212,12 +3228,20 @@
               <a:t>On the </a:t>
             </a:r>
             <a:r>
-              <a:rPr lang="en-US" sz="2400" dirty="0" err="1" smtClean="0"/>
-              <a:t>github</a:t>
-            </a:r>
-            <a:r>
               <a:rPr lang="en-US" sz="2400" dirty="0" smtClean="0"/>
-              <a:t> page, copy the I18n block</a:t>
+              <a:t>GitHub </a:t>
+            </a:r>
+            <a:r>
+              <a:rPr lang="en-US" sz="2400" dirty="0" smtClean="0"/>
+              <a:t>page, copy the </a:t>
+            </a:r>
+            <a:r>
+              <a:rPr lang="en-US" sz="2400" dirty="0" smtClean="0"/>
+              <a:t>i18n </a:t>
+            </a:r>
+            <a:r>
+              <a:rPr lang="en-US" sz="2400" dirty="0" smtClean="0"/>
+              <a:t>block</a:t>
             </a:r>
           </a:p>
           <a:p>
@@ -3452,12 +3476,12 @@
               <a:t>Go at the </a:t>
             </a:r>
             <a:r>
-              <a:rPr lang="en-US" sz="2400" dirty="0" err="1" smtClean="0"/>
-              <a:t>github</a:t>
-            </a:r>
-            <a:r>
               <a:rPr lang="en-US" sz="2400" dirty="0" smtClean="0"/>
-              <a:t> page, and get the Socket Events section</a:t>
+              <a:t>GitHub </a:t>
+            </a:r>
+            <a:r>
+              <a:rPr lang="en-US" sz="2400" dirty="0" smtClean="0"/>
+              <a:t>page, and get the Socket Events section</a:t>
             </a:r>
           </a:p>
           <a:p>
@@ -3594,8 +3618,8 @@
         </p:nvSpPr>
         <p:spPr>
           <a:xfrm>
-            <a:off x="466344" y="713232"/>
-            <a:ext cx="8174736" cy="6278642"/>
+            <a:off x="466344" y="466879"/>
+            <a:ext cx="8174736" cy="6001643"/>
           </a:xfrm>
           <a:prstGeom prst="rect">
             <a:avLst/>
@@ -3645,12 +3669,12 @@
               <a:t>folder and paste the code from the </a:t>
             </a:r>
             <a:r>
-              <a:rPr lang="en-US" sz="2400" dirty="0" err="1" smtClean="0"/>
-              <a:t>github</a:t>
-            </a:r>
-            <a:r>
               <a:rPr lang="en-US" sz="2400" dirty="0" smtClean="0"/>
-              <a:t> page in there</a:t>
+              <a:t>GitHub </a:t>
+            </a:r>
+            <a:r>
+              <a:rPr lang="en-US" sz="2400" dirty="0" smtClean="0"/>
+              <a:t>page in there</a:t>
             </a:r>
           </a:p>
           <a:p>
@@ -3676,12 +3700,12 @@
               <a:t> function from the </a:t>
             </a:r>
             <a:r>
-              <a:rPr lang="en-US" sz="2400" dirty="0" err="1" smtClean="0"/>
-              <a:t>github</a:t>
-            </a:r>
-            <a:r>
               <a:rPr lang="en-US" sz="2400" dirty="0" smtClean="0"/>
-              <a:t> page after our </a:t>
+              <a:t>GitHub </a:t>
+            </a:r>
+            <a:r>
+              <a:rPr lang="en-US" sz="2400" dirty="0" smtClean="0"/>
+              <a:t>page after our </a:t>
             </a:r>
             <a:r>
               <a:rPr lang="en-US" sz="2400" dirty="0" err="1" smtClean="0"/>
@@ -3689,27 +3713,32 @@
             </a:r>
             <a:r>
               <a:rPr lang="en-US" sz="2400" dirty="0" smtClean="0"/>
-              <a:t> function in the app.js file</a:t>
-            </a:r>
+              <a:t> function in the app.js </a:t>
+            </a:r>
+            <a:r>
+              <a:rPr lang="en-US" sz="2400" dirty="0" smtClean="0"/>
+              <a:t>file</a:t>
+            </a:r>
+          </a:p>
+          <a:p>
+            <a:endParaRPr lang="en-US" sz="2400" dirty="0"/>
           </a:p>
           <a:p>
             <a:pPr marL="342900" indent="-342900">
-              <a:buAutoNum type="arabicParenR"/>
-            </a:pPr>
-            <a:endParaRPr lang="en-US" sz="2400" dirty="0"/>
-          </a:p>
-          <a:p>
-            <a:r>
-              <a:rPr lang="en-US" sz="2400" dirty="0" smtClean="0"/>
-              <a:t>- </a:t>
-            </a:r>
+              <a:buFont typeface="Arial" panose="020B0604020202020204" pitchFamily="34" charset="0"/>
+              <a:buChar char="•"/>
+            </a:pPr>
             <a:r>
               <a:rPr lang="en-US" sz="2400" dirty="0" err="1" smtClean="0"/>
               <a:t>formatEvent</a:t>
             </a:r>
             <a:r>
               <a:rPr lang="en-US" sz="2400" dirty="0" smtClean="0"/>
-              <a:t> will allow us to give some </a:t>
+              <a:t> </a:t>
+            </a:r>
+            <a:r>
+              <a:rPr lang="en-US" sz="2400" dirty="0" smtClean="0"/>
+              <a:t>will allow us to give </a:t>
             </a:r>
             <a:r>
               <a:rPr lang="en-US" sz="2400" dirty="0" err="1" smtClean="0"/>
@@ -3717,25 +3746,53 @@
             </a:r>
             <a:r>
               <a:rPr lang="en-US" sz="2400" dirty="0" smtClean="0"/>
-              <a:t> to our HTML template, so it doesn’t have to do any logic</a:t>
-            </a:r>
+              <a:t> </a:t>
+            </a:r>
+            <a:r>
+              <a:rPr lang="en-US" sz="2400" dirty="0" smtClean="0"/>
+              <a:t>to our HTML template, so it doesn’t have to do any </a:t>
+            </a:r>
+            <a:r>
+              <a:rPr lang="en-US" sz="2400" dirty="0" smtClean="0"/>
+              <a:t>logic</a:t>
+            </a:r>
+          </a:p>
+          <a:p>
+            <a:endParaRPr lang="en-US" sz="2400" dirty="0" smtClean="0"/>
           </a:p>
           <a:p>
             <a:pPr marL="342900" indent="-342900">
-              <a:buAutoNum type="arabicParenR"/>
-            </a:pPr>
-            <a:endParaRPr lang="en-US" sz="2400" dirty="0"/>
-          </a:p>
-          <a:p>
+              <a:buFont typeface="Arial" panose="020B0604020202020204" pitchFamily="34" charset="0"/>
+              <a:buChar char="•"/>
+            </a:pPr>
             <a:r>
               <a:rPr lang="en-US" sz="2400" dirty="0" smtClean="0"/>
-              <a:t>- The event.html template is just a table line we’ll add anytime we catch an event</a:t>
-            </a:r>
-          </a:p>
-          <a:p>
-            <a:endParaRPr lang="en-US" sz="2400" dirty="0"/>
-          </a:p>
-          <a:p>
+              <a:t>The </a:t>
+            </a:r>
+            <a:r>
+              <a:rPr lang="en-US" sz="2400" dirty="0" smtClean="0"/>
+              <a:t>event.html template is just a table </a:t>
+            </a:r>
+            <a:r>
+              <a:rPr lang="en-US" sz="2400" dirty="0" smtClean="0"/>
+              <a:t>row we’ll </a:t>
+            </a:r>
+            <a:r>
+              <a:rPr lang="en-US" sz="2400" dirty="0" smtClean="0"/>
+              <a:t>add </a:t>
+            </a:r>
+            <a:r>
+              <a:rPr lang="en-US" sz="2400" dirty="0" smtClean="0"/>
+              <a:t>each time </a:t>
+            </a:r>
+            <a:r>
+              <a:rPr lang="en-US" sz="2400" dirty="0" smtClean="0"/>
+              <a:t>we catch an </a:t>
+            </a:r>
+            <a:r>
+              <a:rPr lang="en-US" sz="2400" dirty="0" smtClean="0"/>
+              <a:t>event</a:t>
+            </a:r>
             <a:endParaRPr lang="en-US" dirty="0"/>
           </a:p>
         </p:txBody>
@@ -3924,7 +3981,6 @@
               <a:rPr lang="en-US" sz="3200" dirty="0" smtClean="0"/>
               <a:t>Call any Kazoo API</a:t>
             </a:r>
-            <a:endParaRPr lang="en-US" sz="3200" dirty="0" smtClean="0"/>
           </a:p>
           <a:p>
             <a:pPr marL="914400" lvl="1" indent="-457200">
@@ -3949,7 +4005,6 @@
               <a:rPr lang="en-US" sz="3200" dirty="0" smtClean="0"/>
               <a:t>Released as a jQuery plugin</a:t>
             </a:r>
-            <a:endParaRPr lang="en-US" sz="3200" dirty="0" smtClean="0"/>
           </a:p>
           <a:p>
             <a:pPr marL="914400" lvl="1" indent="-457200">
@@ -3974,7 +4029,6 @@
               <a:rPr lang="en-US" sz="3200" dirty="0" smtClean="0"/>
               <a:t>Quick example</a:t>
             </a:r>
-            <a:endParaRPr lang="en-US" sz="3200" dirty="0" smtClean="0"/>
           </a:p>
         </p:txBody>
       </p:sp>
@@ -4071,7 +4125,6 @@
               <a:rPr lang="en-US" sz="3200" dirty="0" smtClean="0"/>
               <a:t>New back-end APIs</a:t>
             </a:r>
-            <a:endParaRPr lang="en-US" sz="3200" dirty="0" smtClean="0"/>
           </a:p>
           <a:p>
             <a:pPr marL="742950" lvl="1" indent="-285750">
@@ -4337,11 +4390,7 @@
             <a:pPr lvl="1"/>
             <a:r>
               <a:rPr lang="en-US" sz="2000" dirty="0" smtClean="0"/>
-              <a:t>Jean-Roch </a:t>
-            </a:r>
-            <a:r>
-              <a:rPr lang="en-US" sz="2000" dirty="0" smtClean="0"/>
-              <a:t>Maitre</a:t>
+              <a:t>Jean-Roch Maitre</a:t>
             </a:r>
           </a:p>
           <a:p>
@@ -4352,15 +4401,7 @@
             <a:pPr lvl="1"/>
             <a:r>
               <a:rPr lang="en-US" sz="2000" dirty="0" smtClean="0"/>
-              <a:t>Lead </a:t>
-            </a:r>
-            <a:r>
-              <a:rPr lang="en-US" sz="2000" dirty="0" smtClean="0"/>
-              <a:t>Front-End Engineer @ </a:t>
-            </a:r>
-            <a:r>
-              <a:rPr lang="en-US" sz="2000" dirty="0" smtClean="0"/>
-              <a:t>2600hz</a:t>
+              <a:t>Lead Front-End Engineer @ 2600hz</a:t>
             </a:r>
           </a:p>
           <a:p>
@@ -4402,11 +4443,7 @@
             <a:pPr lvl="1"/>
             <a:r>
               <a:rPr lang="en-US" sz="2000" dirty="0" smtClean="0"/>
-              <a:t>Joris </a:t>
-            </a:r>
-            <a:r>
-              <a:rPr lang="en-US" sz="2000" dirty="0" smtClean="0"/>
-              <a:t>Tirado</a:t>
+              <a:t>Joris Tirado</a:t>
             </a:r>
           </a:p>
           <a:p>
@@ -4417,15 +4454,7 @@
             <a:pPr lvl="1"/>
             <a:r>
               <a:rPr lang="en-US" sz="2000" dirty="0" smtClean="0"/>
-              <a:t>Front-End </a:t>
-            </a:r>
-            <a:r>
-              <a:rPr lang="en-US" sz="2000" dirty="0" smtClean="0"/>
-              <a:t>Engineer @ </a:t>
-            </a:r>
-            <a:r>
-              <a:rPr lang="en-US" sz="2000" dirty="0" smtClean="0"/>
-              <a:t>2600hz</a:t>
+              <a:t>Front-End Engineer @ 2600hz</a:t>
             </a:r>
           </a:p>
           <a:p>
@@ -4580,6 +4609,9 @@
   <p:clrMapOvr>
     <a:masterClrMapping/>
   </p:clrMapOvr>
+  <p:transition spd="slow">
+    <p:push dir="u"/>
+  </p:transition>
   <p:timing>
     <p:tnLst>
       <p:par>
@@ -4971,7 +5003,11 @@
             </a:pPr>
             <a:r>
               <a:rPr lang="en-US" sz="3200" dirty="0" smtClean="0"/>
-              <a:t>List call events as they happen</a:t>
+              <a:t>List call events </a:t>
+            </a:r>
+            <a:r>
+              <a:rPr lang="en-US" sz="3200" dirty="0" smtClean="0"/>
+              <a:t>live</a:t>
             </a:r>
             <a:endParaRPr lang="en-US" sz="3200" dirty="0" smtClean="0"/>
           </a:p>
@@ -5216,13 +5252,8 @@
             </a:pPr>
             <a:r>
               <a:rPr lang="en-US" sz="2400" dirty="0" smtClean="0"/>
-              <a:t>Go at the address of your local </a:t>
-            </a:r>
-            <a:r>
-              <a:rPr lang="en-US" sz="2400" dirty="0" smtClean="0"/>
-              <a:t>Monster UI</a:t>
-            </a:r>
-            <a:endParaRPr lang="en-US" sz="2400" dirty="0" smtClean="0"/>
+              <a:t>Go at the address of your local Monster UI</a:t>
+            </a:r>
           </a:p>
           <a:p>
             <a:pPr marL="342900" indent="-342900">
@@ -5483,15 +5514,7 @@
             </a:pPr>
             <a:r>
               <a:rPr lang="en-US" sz="2400" dirty="0" smtClean="0"/>
-              <a:t>i18n </a:t>
-            </a:r>
-            <a:r>
-              <a:rPr lang="en-US" sz="2400" dirty="0" smtClean="0"/>
-              <a:t>strings in /</a:t>
-            </a:r>
-            <a:r>
-              <a:rPr lang="en-US" sz="2400" dirty="0" smtClean="0"/>
-              <a:t>i18n</a:t>
+              <a:t>i18n strings in /i18n</a:t>
             </a:r>
             <a:endParaRPr lang="en-US" sz="2400" dirty="0"/>
           </a:p>

</xml_diff>